<commit_message>
added bayesian implementation detail
</commit_message>
<xml_diff>
--- a/exploratory_analysis.pptx
+++ b/exploratory_analysis.pptx
@@ -24,6 +24,11 @@
     <p:sldId id="273" r:id="rId18"/>
     <p:sldId id="274" r:id="rId19"/>
     <p:sldId id="275" r:id="rId20"/>
+    <p:sldId id="276" r:id="rId21"/>
+    <p:sldId id="277" r:id="rId22"/>
+    <p:sldId id="278" r:id="rId23"/>
+    <p:sldId id="279" r:id="rId24"/>
+    <p:sldId id="280" r:id="rId25"/>
   </p:sldIdLst>
   <p:sldSz cx="9144000" cy="6858000" type="screen4x3"/>
   <p:notesSz cx="6858000" cy="9144000"/>
@@ -122,6 +127,22 @@
       </a:defRPr>
     </a:lvl9pPr>
   </p:defaultTextStyle>
+  <p:extLst>
+    <p:ext uri="{EFAFB233-063F-42B5-8137-9DF3F51BA10A}">
+      <p15:sldGuideLst xmlns:p15="http://schemas.microsoft.com/office/powerpoint/2012/main">
+        <p15:guide id="1" orient="horz" pos="2160">
+          <p15:clr>
+            <a:srgbClr val="A4A3A4"/>
+          </p15:clr>
+        </p15:guide>
+        <p15:guide id="2" pos="2880">
+          <p15:clr>
+            <a:srgbClr val="A4A3A4"/>
+          </p15:clr>
+        </p15:guide>
+      </p15:sldGuideLst>
+    </p:ext>
+  </p:extLst>
 </p:presentation>
 </file>
 
@@ -306,7 +327,7 @@
           <a:p>
             <a:fld id="{78D2F196-3A47-4CB6-BF2E-B5080B124324}" type="datetimeFigureOut">
               <a:rPr lang="en-US" smtClean="0"/>
-              <a:t>4/19/2017</a:t>
+              <a:t>4/20/2017</a:t>
             </a:fld>
             <a:endParaRPr lang="en-US"/>
           </a:p>
@@ -476,7 +497,7 @@
           <a:p>
             <a:fld id="{78D2F196-3A47-4CB6-BF2E-B5080B124324}" type="datetimeFigureOut">
               <a:rPr lang="en-US" smtClean="0"/>
-              <a:t>4/19/2017</a:t>
+              <a:t>4/20/2017</a:t>
             </a:fld>
             <a:endParaRPr lang="en-US"/>
           </a:p>
@@ -656,7 +677,7 @@
           <a:p>
             <a:fld id="{78D2F196-3A47-4CB6-BF2E-B5080B124324}" type="datetimeFigureOut">
               <a:rPr lang="en-US" smtClean="0"/>
-              <a:t>4/19/2017</a:t>
+              <a:t>4/20/2017</a:t>
             </a:fld>
             <a:endParaRPr lang="en-US"/>
           </a:p>
@@ -826,7 +847,7 @@
           <a:p>
             <a:fld id="{78D2F196-3A47-4CB6-BF2E-B5080B124324}" type="datetimeFigureOut">
               <a:rPr lang="en-US" smtClean="0"/>
-              <a:t>4/19/2017</a:t>
+              <a:t>4/20/2017</a:t>
             </a:fld>
             <a:endParaRPr lang="en-US"/>
           </a:p>
@@ -1072,7 +1093,7 @@
           <a:p>
             <a:fld id="{78D2F196-3A47-4CB6-BF2E-B5080B124324}" type="datetimeFigureOut">
               <a:rPr lang="en-US" smtClean="0"/>
-              <a:t>4/19/2017</a:t>
+              <a:t>4/20/2017</a:t>
             </a:fld>
             <a:endParaRPr lang="en-US"/>
           </a:p>
@@ -1360,7 +1381,7 @@
           <a:p>
             <a:fld id="{78D2F196-3A47-4CB6-BF2E-B5080B124324}" type="datetimeFigureOut">
               <a:rPr lang="en-US" smtClean="0"/>
-              <a:t>4/19/2017</a:t>
+              <a:t>4/20/2017</a:t>
             </a:fld>
             <a:endParaRPr lang="en-US"/>
           </a:p>
@@ -1782,7 +1803,7 @@
           <a:p>
             <a:fld id="{78D2F196-3A47-4CB6-BF2E-B5080B124324}" type="datetimeFigureOut">
               <a:rPr lang="en-US" smtClean="0"/>
-              <a:t>4/19/2017</a:t>
+              <a:t>4/20/2017</a:t>
             </a:fld>
             <a:endParaRPr lang="en-US"/>
           </a:p>
@@ -1900,7 +1921,7 @@
           <a:p>
             <a:fld id="{78D2F196-3A47-4CB6-BF2E-B5080B124324}" type="datetimeFigureOut">
               <a:rPr lang="en-US" smtClean="0"/>
-              <a:t>4/19/2017</a:t>
+              <a:t>4/20/2017</a:t>
             </a:fld>
             <a:endParaRPr lang="en-US"/>
           </a:p>
@@ -1995,7 +2016,7 @@
           <a:p>
             <a:fld id="{78D2F196-3A47-4CB6-BF2E-B5080B124324}" type="datetimeFigureOut">
               <a:rPr lang="en-US" smtClean="0"/>
-              <a:t>4/19/2017</a:t>
+              <a:t>4/20/2017</a:t>
             </a:fld>
             <a:endParaRPr lang="en-US"/>
           </a:p>
@@ -2272,7 +2293,7 @@
           <a:p>
             <a:fld id="{78D2F196-3A47-4CB6-BF2E-B5080B124324}" type="datetimeFigureOut">
               <a:rPr lang="en-US" smtClean="0"/>
-              <a:t>4/19/2017</a:t>
+              <a:t>4/20/2017</a:t>
             </a:fld>
             <a:endParaRPr lang="en-US"/>
           </a:p>
@@ -2525,7 +2546,7 @@
           <a:p>
             <a:fld id="{78D2F196-3A47-4CB6-BF2E-B5080B124324}" type="datetimeFigureOut">
               <a:rPr lang="en-US" smtClean="0"/>
-              <a:t>4/19/2017</a:t>
+              <a:t>4/20/2017</a:t>
             </a:fld>
             <a:endParaRPr lang="en-US"/>
           </a:p>
@@ -2738,7 +2759,7 @@
           <a:p>
             <a:fld id="{78D2F196-3A47-4CB6-BF2E-B5080B124324}" type="datetimeFigureOut">
               <a:rPr lang="en-US" smtClean="0"/>
-              <a:t>4/19/2017</a:t>
+              <a:t>4/20/2017</a:t>
             </a:fld>
             <a:endParaRPr lang="en-US"/>
           </a:p>
@@ -5299,6 +5320,2063 @@
       </p:par>
     </p:tnLst>
   </p:timing>
+</p:sld>
+</file>
+
+<file path=ppt/slides/slide20.xml><?xml version="1.0" encoding="utf-8"?>
+<p:sld xmlns:a="http://schemas.openxmlformats.org/drawingml/2006/main" xmlns:r="http://schemas.openxmlformats.org/officeDocument/2006/relationships" xmlns:p="http://schemas.openxmlformats.org/presentationml/2006/main">
+  <p:cSld>
+    <p:spTree>
+      <p:nvGrpSpPr>
+        <p:cNvPr id="1" name=""/>
+        <p:cNvGrpSpPr/>
+        <p:nvPr/>
+      </p:nvGrpSpPr>
+      <p:grpSpPr>
+        <a:xfrm>
+          <a:off x="0" y="0"/>
+          <a:ext cx="0" cy="0"/>
+          <a:chOff x="0" y="0"/>
+          <a:chExt cx="0" cy="0"/>
+        </a:xfrm>
+      </p:grpSpPr>
+      <p:sp>
+        <p:nvSpPr>
+          <p:cNvPr id="2" name="Title 1"/>
+          <p:cNvSpPr>
+            <a:spLocks noGrp="1"/>
+          </p:cNvSpPr>
+          <p:nvPr>
+            <p:ph type="title"/>
+          </p:nvPr>
+        </p:nvSpPr>
+        <p:spPr/>
+        <p:txBody>
+          <a:bodyPr/>
+          <a:lstStyle/>
+          <a:p>
+            <a:r>
+              <a:rPr lang="en-US" dirty="0" smtClean="0"/>
+              <a:t>Bayesian approach</a:t>
+            </a:r>
+            <a:endParaRPr lang="en-SG" dirty="0"/>
+          </a:p>
+        </p:txBody>
+      </p:sp>
+      <p:sp>
+        <p:nvSpPr>
+          <p:cNvPr id="3" name="TextBox 2"/>
+          <p:cNvSpPr txBox="1"/>
+          <p:nvPr/>
+        </p:nvSpPr>
+        <p:spPr>
+          <a:xfrm>
+            <a:off x="762000" y="2209800"/>
+            <a:ext cx="7543800" cy="2862322"/>
+          </a:xfrm>
+          <a:prstGeom prst="rect">
+            <a:avLst/>
+          </a:prstGeom>
+          <a:noFill/>
+        </p:spPr>
+        <p:txBody>
+          <a:bodyPr wrap="square" rtlCol="0">
+            <a:spAutoFit/>
+          </a:bodyPr>
+          <a:lstStyle/>
+          <a:p>
+            <a:r>
+              <a:rPr lang="en-US" b="1" dirty="0" smtClean="0"/>
+              <a:t>p(</a:t>
+            </a:r>
+            <a:r>
+              <a:rPr lang="en-US" b="1" dirty="0" err="1" smtClean="0"/>
+              <a:t>coupon|person</a:t>
+            </a:r>
+            <a:r>
+              <a:rPr lang="en-US" b="1" dirty="0" smtClean="0"/>
+              <a:t>) : </a:t>
+            </a:r>
+            <a:r>
+              <a:rPr lang="en-US" dirty="0" smtClean="0"/>
+              <a:t>Quantity to be found</a:t>
+            </a:r>
+            <a:endParaRPr lang="en-US" b="1" dirty="0" smtClean="0"/>
+          </a:p>
+          <a:p>
+            <a:endParaRPr lang="en-US" dirty="0" smtClean="0"/>
+          </a:p>
+          <a:p>
+            <a:r>
+              <a:rPr lang="en-US" dirty="0" smtClean="0"/>
+              <a:t>coupon = (genre, discount rate, location)</a:t>
+            </a:r>
+          </a:p>
+          <a:p>
+            <a:r>
+              <a:rPr lang="en-US" dirty="0" smtClean="0"/>
+              <a:t>person = (gender, age, residence)</a:t>
+            </a:r>
+          </a:p>
+          <a:p>
+            <a:endParaRPr lang="en-US" dirty="0"/>
+          </a:p>
+          <a:p>
+            <a:r>
+              <a:rPr lang="en-US" dirty="0" smtClean="0"/>
+              <a:t>p(coupon) = p(genre)*p(discount rate)*p(location)</a:t>
+            </a:r>
+          </a:p>
+          <a:p>
+            <a:r>
+              <a:rPr lang="en-US" dirty="0"/>
+              <a:t>p</a:t>
+            </a:r>
+            <a:r>
+              <a:rPr lang="en-US" dirty="0" smtClean="0"/>
+              <a:t>(person) = p(gender)*p(age)*p(residence)</a:t>
+            </a:r>
+          </a:p>
+          <a:p>
+            <a:endParaRPr lang="en-US" dirty="0"/>
+          </a:p>
+          <a:p>
+            <a:endParaRPr lang="en-US" dirty="0" smtClean="0"/>
+          </a:p>
+          <a:p>
+            <a:r>
+              <a:rPr lang="en-US" dirty="0" smtClean="0"/>
+              <a:t>For continuous variable either use distribution or divide it into discrete groups</a:t>
+            </a:r>
+            <a:endParaRPr lang="en-SG" dirty="0"/>
+          </a:p>
+        </p:txBody>
+      </p:sp>
+    </p:spTree>
+    <p:extLst>
+      <p:ext uri="{BB962C8B-B14F-4D97-AF65-F5344CB8AC3E}">
+        <p14:creationId xmlns:p14="http://schemas.microsoft.com/office/powerpoint/2010/main" val="1639759257"/>
+      </p:ext>
+    </p:extLst>
+  </p:cSld>
+  <p:clrMapOvr>
+    <a:masterClrMapping/>
+  </p:clrMapOvr>
+</p:sld>
+</file>
+
+<file path=ppt/slides/slide21.xml><?xml version="1.0" encoding="utf-8"?>
+<p:sld xmlns:a="http://schemas.openxmlformats.org/drawingml/2006/main" xmlns:r="http://schemas.openxmlformats.org/officeDocument/2006/relationships" xmlns:p="http://schemas.openxmlformats.org/presentationml/2006/main">
+  <p:cSld>
+    <p:spTree>
+      <p:nvGrpSpPr>
+        <p:cNvPr id="1" name=""/>
+        <p:cNvGrpSpPr/>
+        <p:nvPr/>
+      </p:nvGrpSpPr>
+      <p:grpSpPr>
+        <a:xfrm>
+          <a:off x="0" y="0"/>
+          <a:ext cx="0" cy="0"/>
+          <a:chOff x="0" y="0"/>
+          <a:chExt cx="0" cy="0"/>
+        </a:xfrm>
+      </p:grpSpPr>
+      <p:sp>
+        <p:nvSpPr>
+          <p:cNvPr id="2" name="Title 1"/>
+          <p:cNvSpPr>
+            <a:spLocks noGrp="1"/>
+          </p:cNvSpPr>
+          <p:nvPr>
+            <p:ph type="title"/>
+          </p:nvPr>
+        </p:nvSpPr>
+        <p:spPr/>
+        <p:txBody>
+          <a:bodyPr/>
+          <a:lstStyle/>
+          <a:p>
+            <a:r>
+              <a:rPr lang="en-US" dirty="0" smtClean="0"/>
+              <a:t>Bayesian approach</a:t>
+            </a:r>
+            <a:endParaRPr lang="en-SG" dirty="0"/>
+          </a:p>
+        </p:txBody>
+      </p:sp>
+      <p:sp>
+        <p:nvSpPr>
+          <p:cNvPr id="3" name="TextBox 2"/>
+          <p:cNvSpPr txBox="1"/>
+          <p:nvPr/>
+        </p:nvSpPr>
+        <p:spPr>
+          <a:xfrm>
+            <a:off x="228600" y="1219200"/>
+            <a:ext cx="9636034" cy="6463308"/>
+          </a:xfrm>
+          <a:prstGeom prst="rect">
+            <a:avLst/>
+          </a:prstGeom>
+          <a:noFill/>
+        </p:spPr>
+        <p:txBody>
+          <a:bodyPr wrap="square" rtlCol="0">
+            <a:spAutoFit/>
+          </a:bodyPr>
+          <a:lstStyle/>
+          <a:p>
+            <a:r>
+              <a:rPr lang="en-US" b="1" dirty="0" smtClean="0"/>
+              <a:t>Step 1:</a:t>
+            </a:r>
+          </a:p>
+          <a:p>
+            <a:r>
+              <a:rPr lang="en-US" b="1" dirty="0" smtClean="0"/>
+              <a:t>p(</a:t>
+            </a:r>
+            <a:r>
+              <a:rPr lang="en-US" b="1" dirty="0" err="1" smtClean="0"/>
+              <a:t>coupon|person</a:t>
+            </a:r>
+            <a:r>
+              <a:rPr lang="en-US" b="1" dirty="0" smtClean="0"/>
+              <a:t>)  = </a:t>
+            </a:r>
+            <a:r>
+              <a:rPr lang="en-US" dirty="0" smtClean="0"/>
+              <a:t>p(</a:t>
+            </a:r>
+            <a:r>
+              <a:rPr lang="en-US" dirty="0" err="1" smtClean="0"/>
+              <a:t>genre|person</a:t>
+            </a:r>
+            <a:r>
+              <a:rPr lang="en-US" dirty="0" smtClean="0"/>
+              <a:t>)*p(discount </a:t>
+            </a:r>
+            <a:r>
+              <a:rPr lang="en-US" dirty="0" err="1" smtClean="0"/>
+              <a:t>rate|person</a:t>
+            </a:r>
+            <a:r>
+              <a:rPr lang="en-US" dirty="0" smtClean="0"/>
+              <a:t>)*p(</a:t>
+            </a:r>
+            <a:r>
+              <a:rPr lang="en-US" dirty="0" err="1" smtClean="0"/>
+              <a:t>location|person</a:t>
+            </a:r>
+            <a:r>
+              <a:rPr lang="en-US" dirty="0" smtClean="0"/>
+              <a:t>)</a:t>
+            </a:r>
+          </a:p>
+          <a:p>
+            <a:endParaRPr lang="en-US" b="1" dirty="0"/>
+          </a:p>
+          <a:p>
+            <a:r>
+              <a:rPr lang="en-US" b="1" dirty="0" smtClean="0"/>
+              <a:t>Step 2a:</a:t>
+            </a:r>
+          </a:p>
+          <a:p>
+            <a:r>
+              <a:rPr lang="en-US" b="1" dirty="0" smtClean="0"/>
+              <a:t>p(</a:t>
+            </a:r>
+            <a:r>
+              <a:rPr lang="en-US" b="1" dirty="0" err="1" smtClean="0"/>
+              <a:t>genre|person</a:t>
+            </a:r>
+            <a:r>
+              <a:rPr lang="en-US" b="1" dirty="0" smtClean="0"/>
+              <a:t>) =  </a:t>
+            </a:r>
+            <a:r>
+              <a:rPr lang="en-US" dirty="0" smtClean="0"/>
+              <a:t>p(genre)*p(</a:t>
+            </a:r>
+            <a:r>
+              <a:rPr lang="en-US" dirty="0" err="1" smtClean="0"/>
+              <a:t>person|genre</a:t>
+            </a:r>
+            <a:r>
+              <a:rPr lang="en-US" dirty="0" smtClean="0"/>
+              <a:t>)/p(person)</a:t>
+            </a:r>
+          </a:p>
+          <a:p>
+            <a:endParaRPr lang="en-US" dirty="0"/>
+          </a:p>
+          <a:p>
+            <a:r>
+              <a:rPr lang="en-US" b="1" dirty="0" smtClean="0"/>
+              <a:t>Step 2b:</a:t>
+            </a:r>
+          </a:p>
+          <a:p>
+            <a:r>
+              <a:rPr lang="en-US" b="1" dirty="0" smtClean="0"/>
+              <a:t>p(discount </a:t>
+            </a:r>
+            <a:r>
+              <a:rPr lang="en-US" b="1" dirty="0" err="1" smtClean="0"/>
+              <a:t>rate|person</a:t>
+            </a:r>
+            <a:r>
+              <a:rPr lang="en-US" b="1" dirty="0" smtClean="0"/>
+              <a:t>) = </a:t>
+            </a:r>
+            <a:r>
+              <a:rPr lang="en-US" dirty="0" smtClean="0"/>
+              <a:t>p(discount rate)*p(</a:t>
+            </a:r>
+            <a:r>
+              <a:rPr lang="en-US" dirty="0" err="1" smtClean="0"/>
+              <a:t>person|discount</a:t>
+            </a:r>
+            <a:r>
+              <a:rPr lang="en-US" dirty="0" smtClean="0"/>
+              <a:t> rate)/p(person)</a:t>
+            </a:r>
+            <a:endParaRPr lang="en-US" b="1" dirty="0" smtClean="0"/>
+          </a:p>
+          <a:p>
+            <a:r>
+              <a:rPr lang="en-US" b="1" dirty="0" smtClean="0"/>
+              <a:t>.</a:t>
+            </a:r>
+          </a:p>
+          <a:p>
+            <a:r>
+              <a:rPr lang="en-US" b="1" dirty="0" smtClean="0"/>
+              <a:t>.</a:t>
+            </a:r>
+          </a:p>
+          <a:p>
+            <a:r>
+              <a:rPr lang="en-US" b="1" dirty="0" smtClean="0"/>
+              <a:t>.</a:t>
+            </a:r>
+          </a:p>
+          <a:p>
+            <a:r>
+              <a:rPr lang="en-US" b="1" dirty="0" smtClean="0"/>
+              <a:t>Step 3a:</a:t>
+            </a:r>
+          </a:p>
+          <a:p>
+            <a:r>
+              <a:rPr lang="en-US" b="1" dirty="0" smtClean="0"/>
+              <a:t>p(</a:t>
+            </a:r>
+            <a:r>
+              <a:rPr lang="en-US" b="1" dirty="0" err="1" smtClean="0"/>
+              <a:t>person|genre</a:t>
+            </a:r>
+            <a:r>
+              <a:rPr lang="en-US" b="1" dirty="0" smtClean="0"/>
+              <a:t>) = </a:t>
+            </a:r>
+            <a:r>
+              <a:rPr lang="en-US" dirty="0" smtClean="0"/>
+              <a:t>p(</a:t>
+            </a:r>
+            <a:r>
+              <a:rPr lang="en-US" dirty="0" err="1" smtClean="0"/>
+              <a:t>sex|genre</a:t>
+            </a:r>
+            <a:r>
+              <a:rPr lang="en-US" dirty="0" smtClean="0"/>
+              <a:t>)*p(residential </a:t>
+            </a:r>
+            <a:r>
+              <a:rPr lang="en-US" dirty="0" err="1" smtClean="0"/>
+              <a:t>location|genre</a:t>
+            </a:r>
+            <a:r>
+              <a:rPr lang="en-US" dirty="0" smtClean="0"/>
+              <a:t>)*p(</a:t>
+            </a:r>
+            <a:r>
+              <a:rPr lang="en-US" dirty="0" err="1" smtClean="0"/>
+              <a:t>age|genre</a:t>
+            </a:r>
+            <a:r>
+              <a:rPr lang="en-US" dirty="0" smtClean="0"/>
+              <a:t>)</a:t>
+            </a:r>
+          </a:p>
+          <a:p>
+            <a:endParaRPr lang="en-US" dirty="0"/>
+          </a:p>
+          <a:p>
+            <a:r>
+              <a:rPr lang="en-US" b="1" dirty="0" smtClean="0"/>
+              <a:t>Step 3b:</a:t>
+            </a:r>
+          </a:p>
+          <a:p>
+            <a:r>
+              <a:rPr lang="en-US" b="1" dirty="0" smtClean="0"/>
+              <a:t>p(</a:t>
+            </a:r>
+            <a:r>
+              <a:rPr lang="en-US" b="1" dirty="0" err="1" smtClean="0"/>
+              <a:t>person|discount</a:t>
+            </a:r>
+            <a:r>
+              <a:rPr lang="en-US" b="1" dirty="0" smtClean="0"/>
+              <a:t> rate) = </a:t>
+            </a:r>
+            <a:r>
+              <a:rPr lang="en-US" dirty="0" smtClean="0"/>
+              <a:t>p(</a:t>
+            </a:r>
+            <a:r>
+              <a:rPr lang="en-US" dirty="0" err="1" smtClean="0"/>
+              <a:t>sex|discount</a:t>
+            </a:r>
+            <a:r>
+              <a:rPr lang="en-US" dirty="0" smtClean="0"/>
+              <a:t> rate)*p(residential </a:t>
+            </a:r>
+            <a:r>
+              <a:rPr lang="en-US" dirty="0" err="1" smtClean="0"/>
+              <a:t>location|discount</a:t>
+            </a:r>
+            <a:r>
+              <a:rPr lang="en-US" dirty="0" smtClean="0"/>
+              <a:t> rate)*p(</a:t>
+            </a:r>
+            <a:r>
+              <a:rPr lang="en-US" dirty="0" err="1" smtClean="0"/>
+              <a:t>age|discount</a:t>
+            </a:r>
+            <a:r>
+              <a:rPr lang="en-US" dirty="0" smtClean="0"/>
+              <a:t> rate)</a:t>
+            </a:r>
+          </a:p>
+          <a:p>
+            <a:r>
+              <a:rPr lang="en-US" b="1" dirty="0" smtClean="0"/>
+              <a:t>.</a:t>
+            </a:r>
+          </a:p>
+          <a:p>
+            <a:r>
+              <a:rPr lang="en-US" b="1" dirty="0" smtClean="0"/>
+              <a:t>.</a:t>
+            </a:r>
+          </a:p>
+          <a:p>
+            <a:r>
+              <a:rPr lang="en-US" b="1" dirty="0"/>
+              <a:t>.</a:t>
+            </a:r>
+            <a:endParaRPr lang="en-US" b="1" dirty="0" smtClean="0"/>
+          </a:p>
+          <a:p>
+            <a:endParaRPr lang="en-US" b="1" dirty="0"/>
+          </a:p>
+          <a:p>
+            <a:endParaRPr lang="en-US" b="1" dirty="0" smtClean="0"/>
+          </a:p>
+          <a:p>
+            <a:endParaRPr lang="en-US" dirty="0" smtClean="0"/>
+          </a:p>
+        </p:txBody>
+      </p:sp>
+    </p:spTree>
+    <p:extLst>
+      <p:ext uri="{BB962C8B-B14F-4D97-AF65-F5344CB8AC3E}">
+        <p14:creationId xmlns:p14="http://schemas.microsoft.com/office/powerpoint/2010/main" val="2192437797"/>
+      </p:ext>
+    </p:extLst>
+  </p:cSld>
+  <p:clrMapOvr>
+    <a:masterClrMapping/>
+  </p:clrMapOvr>
+</p:sld>
+</file>
+
+<file path=ppt/slides/slide22.xml><?xml version="1.0" encoding="utf-8"?>
+<p:sld xmlns:a="http://schemas.openxmlformats.org/drawingml/2006/main" xmlns:r="http://schemas.openxmlformats.org/officeDocument/2006/relationships" xmlns:p="http://schemas.openxmlformats.org/presentationml/2006/main">
+  <p:cSld>
+    <p:spTree>
+      <p:nvGrpSpPr>
+        <p:cNvPr id="1" name=""/>
+        <p:cNvGrpSpPr/>
+        <p:nvPr/>
+      </p:nvGrpSpPr>
+      <p:grpSpPr>
+        <a:xfrm>
+          <a:off x="0" y="0"/>
+          <a:ext cx="0" cy="0"/>
+          <a:chOff x="0" y="0"/>
+          <a:chExt cx="0" cy="0"/>
+        </a:xfrm>
+      </p:grpSpPr>
+      <p:sp>
+        <p:nvSpPr>
+          <p:cNvPr id="2" name="Title 1"/>
+          <p:cNvSpPr>
+            <a:spLocks noGrp="1"/>
+          </p:cNvSpPr>
+          <p:nvPr>
+            <p:ph type="title"/>
+          </p:nvPr>
+        </p:nvSpPr>
+        <p:spPr/>
+        <p:txBody>
+          <a:bodyPr/>
+          <a:lstStyle/>
+          <a:p>
+            <a:r>
+              <a:rPr lang="en-US" dirty="0" smtClean="0"/>
+              <a:t>Bayesian approach</a:t>
+            </a:r>
+            <a:endParaRPr lang="en-SG" dirty="0"/>
+          </a:p>
+        </p:txBody>
+      </p:sp>
+      <p:sp>
+        <p:nvSpPr>
+          <p:cNvPr id="3" name="Rectangle 2"/>
+          <p:cNvSpPr/>
+          <p:nvPr/>
+        </p:nvSpPr>
+        <p:spPr>
+          <a:xfrm>
+            <a:off x="990600" y="1752600"/>
+            <a:ext cx="5943600" cy="2031325"/>
+          </a:xfrm>
+          <a:prstGeom prst="rect">
+            <a:avLst/>
+          </a:prstGeom>
+        </p:spPr>
+        <p:txBody>
+          <a:bodyPr wrap="square">
+            <a:spAutoFit/>
+          </a:bodyPr>
+          <a:lstStyle/>
+          <a:p>
+            <a:endParaRPr lang="en-US" dirty="0"/>
+          </a:p>
+          <a:p>
+            <a:endParaRPr lang="en-US" b="1" dirty="0"/>
+          </a:p>
+          <a:p>
+            <a:r>
+              <a:rPr lang="en-US" b="1" dirty="0"/>
+              <a:t>Step 4:</a:t>
+            </a:r>
+          </a:p>
+          <a:p>
+            <a:r>
+              <a:rPr lang="en-US" b="1" dirty="0"/>
+              <a:t>p(person) = </a:t>
+            </a:r>
+            <a:r>
+              <a:rPr lang="en-US" dirty="0"/>
+              <a:t>p(sex)*p(residential location)*p(age)</a:t>
+            </a:r>
+          </a:p>
+          <a:p>
+            <a:endParaRPr lang="en-US" b="1" dirty="0"/>
+          </a:p>
+          <a:p>
+            <a:r>
+              <a:rPr lang="en-US" b="1" dirty="0"/>
+              <a:t>Now we have all the variable we can go for it. </a:t>
+            </a:r>
+            <a:r>
+              <a:rPr lang="en-US" b="1" dirty="0">
+                <a:sym typeface="Wingdings" panose="05000000000000000000" pitchFamily="2" charset="2"/>
+              </a:rPr>
+              <a:t></a:t>
+            </a:r>
+          </a:p>
+          <a:p>
+            <a:r>
+              <a:rPr lang="en-US" b="1" dirty="0">
+                <a:sym typeface="Wingdings" panose="05000000000000000000" pitchFamily="2" charset="2"/>
+              </a:rPr>
+              <a:t>Let’s try and see where I end up </a:t>
+            </a:r>
+            <a:endParaRPr lang="en-US" b="1" dirty="0"/>
+          </a:p>
+        </p:txBody>
+      </p:sp>
+    </p:spTree>
+    <p:extLst>
+      <p:ext uri="{BB962C8B-B14F-4D97-AF65-F5344CB8AC3E}">
+        <p14:creationId xmlns:p14="http://schemas.microsoft.com/office/powerpoint/2010/main" val="486134075"/>
+      </p:ext>
+    </p:extLst>
+  </p:cSld>
+  <p:clrMapOvr>
+    <a:masterClrMapping/>
+  </p:clrMapOvr>
+</p:sld>
+</file>
+
+<file path=ppt/slides/slide23.xml><?xml version="1.0" encoding="utf-8"?>
+<p:sld xmlns:a="http://schemas.openxmlformats.org/drawingml/2006/main" xmlns:r="http://schemas.openxmlformats.org/officeDocument/2006/relationships" xmlns:p="http://schemas.openxmlformats.org/presentationml/2006/main">
+  <p:cSld>
+    <p:spTree>
+      <p:nvGrpSpPr>
+        <p:cNvPr id="1" name=""/>
+        <p:cNvGrpSpPr/>
+        <p:nvPr/>
+      </p:nvGrpSpPr>
+      <p:grpSpPr>
+        <a:xfrm>
+          <a:off x="0" y="0"/>
+          <a:ext cx="0" cy="0"/>
+          <a:chOff x="0" y="0"/>
+          <a:chExt cx="0" cy="0"/>
+        </a:xfrm>
+      </p:grpSpPr>
+      <p:sp>
+        <p:nvSpPr>
+          <p:cNvPr id="2" name="Title 1"/>
+          <p:cNvSpPr>
+            <a:spLocks noGrp="1"/>
+          </p:cNvSpPr>
+          <p:nvPr>
+            <p:ph type="title"/>
+          </p:nvPr>
+        </p:nvSpPr>
+        <p:spPr/>
+        <p:txBody>
+          <a:bodyPr/>
+          <a:lstStyle/>
+          <a:p>
+            <a:r>
+              <a:rPr lang="en-US" dirty="0" smtClean="0"/>
+              <a:t>Bayesian approach: Final formula</a:t>
+            </a:r>
+            <a:endParaRPr lang="en-SG" dirty="0"/>
+          </a:p>
+        </p:txBody>
+      </p:sp>
+      <p:sp>
+        <p:nvSpPr>
+          <p:cNvPr id="3" name="Rectangle 2"/>
+          <p:cNvSpPr/>
+          <p:nvPr/>
+        </p:nvSpPr>
+        <p:spPr>
+          <a:xfrm>
+            <a:off x="304800" y="1752600"/>
+            <a:ext cx="8763000" cy="1200329"/>
+          </a:xfrm>
+          <a:prstGeom prst="rect">
+            <a:avLst/>
+          </a:prstGeom>
+        </p:spPr>
+        <p:txBody>
+          <a:bodyPr wrap="square">
+            <a:spAutoFit/>
+          </a:bodyPr>
+          <a:lstStyle/>
+          <a:p>
+            <a:endParaRPr lang="en-US" dirty="0"/>
+          </a:p>
+          <a:p>
+            <a:r>
+              <a:rPr lang="en-US" b="1" dirty="0" smtClean="0"/>
+              <a:t>p(genre)*p(</a:t>
+            </a:r>
+            <a:r>
+              <a:rPr lang="en-US" b="1" dirty="0" err="1" smtClean="0"/>
+              <a:t>sex|genre</a:t>
+            </a:r>
+            <a:r>
+              <a:rPr lang="en-US" b="1" dirty="0" smtClean="0"/>
+              <a:t>)*p(</a:t>
+            </a:r>
+            <a:r>
+              <a:rPr lang="en-US" b="1" dirty="0" err="1" smtClean="0"/>
+              <a:t>residential|genre</a:t>
+            </a:r>
+            <a:r>
+              <a:rPr lang="en-US" b="1" dirty="0" smtClean="0"/>
+              <a:t>)*p(</a:t>
+            </a:r>
+            <a:r>
+              <a:rPr lang="en-US" b="1" dirty="0" err="1" smtClean="0"/>
+              <a:t>age|genre</a:t>
+            </a:r>
+            <a:r>
+              <a:rPr lang="en-US" b="1" dirty="0" smtClean="0"/>
+              <a:t>)*</a:t>
+            </a:r>
+          </a:p>
+          <a:p>
+            <a:r>
+              <a:rPr lang="en-US" b="1" dirty="0" smtClean="0"/>
+              <a:t>p(location)*p(</a:t>
+            </a:r>
+            <a:r>
+              <a:rPr lang="en-US" b="1" dirty="0" err="1" smtClean="0"/>
+              <a:t>sex|location</a:t>
+            </a:r>
+            <a:r>
+              <a:rPr lang="en-US" b="1" dirty="0" smtClean="0"/>
+              <a:t>)*p(</a:t>
+            </a:r>
+            <a:r>
+              <a:rPr lang="en-US" b="1" dirty="0" err="1" smtClean="0"/>
+              <a:t>residential|location</a:t>
+            </a:r>
+            <a:r>
+              <a:rPr lang="en-US" b="1" dirty="0" smtClean="0"/>
+              <a:t>)*p(</a:t>
+            </a:r>
+            <a:r>
+              <a:rPr lang="en-US" b="1" dirty="0" err="1" smtClean="0"/>
+              <a:t>age|location</a:t>
+            </a:r>
+            <a:r>
+              <a:rPr lang="en-US" b="1" dirty="0" smtClean="0"/>
+              <a:t>)*</a:t>
+            </a:r>
+          </a:p>
+          <a:p>
+            <a:r>
+              <a:rPr lang="en-US" b="1" dirty="0" smtClean="0"/>
+              <a:t>p(discount rate)*p(</a:t>
+            </a:r>
+            <a:r>
+              <a:rPr lang="en-US" b="1" dirty="0" err="1" smtClean="0"/>
+              <a:t>sex|discount</a:t>
+            </a:r>
+            <a:r>
+              <a:rPr lang="en-US" b="1" dirty="0" smtClean="0"/>
+              <a:t> rate)*p(</a:t>
+            </a:r>
+            <a:r>
+              <a:rPr lang="en-US" b="1" dirty="0" err="1" smtClean="0"/>
+              <a:t>residential|discount</a:t>
+            </a:r>
+            <a:r>
+              <a:rPr lang="en-US" b="1" dirty="0" smtClean="0"/>
+              <a:t> rate)*p(</a:t>
+            </a:r>
+            <a:r>
+              <a:rPr lang="en-US" b="1" dirty="0" err="1" smtClean="0"/>
+              <a:t>age|discount</a:t>
+            </a:r>
+            <a:r>
+              <a:rPr lang="en-US" b="1" dirty="0" smtClean="0"/>
+              <a:t> rate)</a:t>
+            </a:r>
+            <a:endParaRPr lang="en-US" b="1" dirty="0"/>
+          </a:p>
+        </p:txBody>
+      </p:sp>
+    </p:spTree>
+    <p:extLst>
+      <p:ext uri="{BB962C8B-B14F-4D97-AF65-F5344CB8AC3E}">
+        <p14:creationId xmlns:p14="http://schemas.microsoft.com/office/powerpoint/2010/main" val="1669831283"/>
+      </p:ext>
+    </p:extLst>
+  </p:cSld>
+  <p:clrMapOvr>
+    <a:masterClrMapping/>
+  </p:clrMapOvr>
+</p:sld>
+</file>
+
+<file path=ppt/slides/slide24.xml><?xml version="1.0" encoding="utf-8"?>
+<p:sld xmlns:a="http://schemas.openxmlformats.org/drawingml/2006/main" xmlns:r="http://schemas.openxmlformats.org/officeDocument/2006/relationships" xmlns:p="http://schemas.openxmlformats.org/presentationml/2006/main">
+  <p:cSld>
+    <p:spTree>
+      <p:nvGrpSpPr>
+        <p:cNvPr id="1" name=""/>
+        <p:cNvGrpSpPr/>
+        <p:nvPr/>
+      </p:nvGrpSpPr>
+      <p:grpSpPr>
+        <a:xfrm>
+          <a:off x="0" y="0"/>
+          <a:ext cx="0" cy="0"/>
+          <a:chOff x="0" y="0"/>
+          <a:chExt cx="0" cy="0"/>
+        </a:xfrm>
+      </p:grpSpPr>
+      <p:sp>
+        <p:nvSpPr>
+          <p:cNvPr id="2" name="Title 1"/>
+          <p:cNvSpPr>
+            <a:spLocks noGrp="1"/>
+          </p:cNvSpPr>
+          <p:nvPr>
+            <p:ph type="title"/>
+          </p:nvPr>
+        </p:nvSpPr>
+        <p:spPr/>
+        <p:txBody>
+          <a:bodyPr/>
+          <a:lstStyle/>
+          <a:p>
+            <a:r>
+              <a:rPr lang="en-US" dirty="0" smtClean="0"/>
+              <a:t>Formal notations</a:t>
+            </a:r>
+            <a:endParaRPr lang="en-SG" dirty="0"/>
+          </a:p>
+        </p:txBody>
+      </p:sp>
+      <mc:AlternateContent xmlns:mc="http://schemas.openxmlformats.org/markup-compatibility/2006">
+        <mc:Choice xmlns:a14="http://schemas.microsoft.com/office/drawing/2010/main" Requires="a14">
+          <p:sp>
+            <p:nvSpPr>
+              <p:cNvPr id="3" name="Rectangle 2"/>
+              <p:cNvSpPr/>
+              <p:nvPr/>
+            </p:nvSpPr>
+            <p:spPr>
+              <a:xfrm>
+                <a:off x="304800" y="1752600"/>
+                <a:ext cx="8763000" cy="1477328"/>
+              </a:xfrm>
+              <a:prstGeom prst="rect">
+                <a:avLst/>
+              </a:prstGeom>
+            </p:spPr>
+            <p:txBody>
+              <a:bodyPr wrap="square">
+                <a:spAutoFit/>
+              </a:bodyPr>
+              <a:lstStyle/>
+              <a:p>
+                <a14:m>
+                  <m:oMathPara xmlns:m="http://schemas.openxmlformats.org/officeDocument/2006/math">
+                    <m:oMathParaPr>
+                      <m:jc m:val="centerGroup"/>
+                    </m:oMathParaPr>
+                    <m:oMath xmlns:m="http://schemas.openxmlformats.org/officeDocument/2006/math">
+                      <m:r>
+                        <a:rPr lang="en-US" b="1" i="1" smtClean="0">
+                          <a:latin typeface="Cambria Math" panose="02040503050406030204" pitchFamily="18" charset="0"/>
+                        </a:rPr>
+                        <m:t>𝒖</m:t>
+                      </m:r>
+                      <m:r>
+                        <a:rPr lang="en-US" b="0" i="1" smtClean="0">
+                          <a:latin typeface="Cambria Math" panose="02040503050406030204" pitchFamily="18" charset="0"/>
+                        </a:rPr>
+                        <m:t>=</m:t>
+                      </m:r>
+                      <m:d>
+                        <m:dPr>
+                          <m:ctrlPr>
+                            <a:rPr lang="en-US" b="0" i="1" smtClean="0">
+                              <a:latin typeface="Cambria Math" panose="02040503050406030204" pitchFamily="18" charset="0"/>
+                            </a:rPr>
+                          </m:ctrlPr>
+                        </m:dPr>
+                        <m:e>
+                          <m:sSub>
+                            <m:sSubPr>
+                              <m:ctrlPr>
+                                <a:rPr lang="en-US" b="0" i="1" smtClean="0">
+                                  <a:latin typeface="Cambria Math" panose="02040503050406030204" pitchFamily="18" charset="0"/>
+                                </a:rPr>
+                              </m:ctrlPr>
+                            </m:sSubPr>
+                            <m:e>
+                              <m:r>
+                                <a:rPr lang="en-US" b="0" i="1" smtClean="0">
+                                  <a:latin typeface="Cambria Math" panose="02040503050406030204" pitchFamily="18" charset="0"/>
+                                </a:rPr>
+                                <m:t>𝑢</m:t>
+                              </m:r>
+                            </m:e>
+                            <m:sub>
+                              <m:r>
+                                <a:rPr lang="en-US" b="0" i="1" smtClean="0">
+                                  <a:latin typeface="Cambria Math" panose="02040503050406030204" pitchFamily="18" charset="0"/>
+                                </a:rPr>
+                                <m:t>1</m:t>
+                              </m:r>
+                            </m:sub>
+                          </m:sSub>
+                          <m:r>
+                            <a:rPr lang="en-US" b="0" i="1" smtClean="0">
+                              <a:latin typeface="Cambria Math" panose="02040503050406030204" pitchFamily="18" charset="0"/>
+                            </a:rPr>
+                            <m:t>, </m:t>
+                          </m:r>
+                          <m:sSub>
+                            <m:sSubPr>
+                              <m:ctrlPr>
+                                <a:rPr lang="en-US" b="0" i="1" smtClean="0">
+                                  <a:latin typeface="Cambria Math" panose="02040503050406030204" pitchFamily="18" charset="0"/>
+                                </a:rPr>
+                              </m:ctrlPr>
+                            </m:sSubPr>
+                            <m:e>
+                              <m:r>
+                                <a:rPr lang="en-US" b="0" i="1" smtClean="0">
+                                  <a:latin typeface="Cambria Math" panose="02040503050406030204" pitchFamily="18" charset="0"/>
+                                </a:rPr>
+                                <m:t>𝑢</m:t>
+                              </m:r>
+                            </m:e>
+                            <m:sub>
+                              <m:r>
+                                <a:rPr lang="en-US" b="0" i="1" smtClean="0">
+                                  <a:latin typeface="Cambria Math" panose="02040503050406030204" pitchFamily="18" charset="0"/>
+                                </a:rPr>
+                                <m:t>2</m:t>
+                              </m:r>
+                            </m:sub>
+                          </m:sSub>
+                          <m:r>
+                            <a:rPr lang="en-US" b="0" i="1" smtClean="0">
+                              <a:latin typeface="Cambria Math" panose="02040503050406030204" pitchFamily="18" charset="0"/>
+                            </a:rPr>
+                            <m:t>,….,</m:t>
+                          </m:r>
+                          <m:sSub>
+                            <m:sSubPr>
+                              <m:ctrlPr>
+                                <a:rPr lang="en-US" b="0" i="1" smtClean="0">
+                                  <a:latin typeface="Cambria Math" panose="02040503050406030204" pitchFamily="18" charset="0"/>
+                                </a:rPr>
+                              </m:ctrlPr>
+                            </m:sSubPr>
+                            <m:e>
+                              <m:r>
+                                <a:rPr lang="en-US" b="0" i="1" smtClean="0">
+                                  <a:latin typeface="Cambria Math" panose="02040503050406030204" pitchFamily="18" charset="0"/>
+                                </a:rPr>
+                                <m:t>𝑢</m:t>
+                              </m:r>
+                            </m:e>
+                            <m:sub>
+                              <m:r>
+                                <a:rPr lang="en-US" b="0" i="1" smtClean="0">
+                                  <a:latin typeface="Cambria Math" panose="02040503050406030204" pitchFamily="18" charset="0"/>
+                                </a:rPr>
+                                <m:t>𝑛</m:t>
+                              </m:r>
+                              <m:r>
+                                <a:rPr lang="en-US" b="0" i="1" smtClean="0">
+                                  <a:latin typeface="Cambria Math" panose="02040503050406030204" pitchFamily="18" charset="0"/>
+                                </a:rPr>
+                                <m:t>−1</m:t>
+                              </m:r>
+                            </m:sub>
+                          </m:sSub>
+                          <m:r>
+                            <a:rPr lang="en-US" b="0" i="1" smtClean="0">
+                              <a:latin typeface="Cambria Math" panose="02040503050406030204" pitchFamily="18" charset="0"/>
+                            </a:rPr>
+                            <m:t>, </m:t>
+                          </m:r>
+                          <m:sSub>
+                            <m:sSubPr>
+                              <m:ctrlPr>
+                                <a:rPr lang="en-US" b="0" i="1" smtClean="0">
+                                  <a:latin typeface="Cambria Math" panose="02040503050406030204" pitchFamily="18" charset="0"/>
+                                </a:rPr>
+                              </m:ctrlPr>
+                            </m:sSubPr>
+                            <m:e>
+                              <m:r>
+                                <a:rPr lang="en-US" b="0" i="1" smtClean="0">
+                                  <a:latin typeface="Cambria Math" panose="02040503050406030204" pitchFamily="18" charset="0"/>
+                                </a:rPr>
+                                <m:t>𝑢</m:t>
+                              </m:r>
+                            </m:e>
+                            <m:sub>
+                              <m:r>
+                                <a:rPr lang="en-US" b="0" i="1" smtClean="0">
+                                  <a:latin typeface="Cambria Math" panose="02040503050406030204" pitchFamily="18" charset="0"/>
+                                </a:rPr>
+                                <m:t>𝑛</m:t>
+                              </m:r>
+                            </m:sub>
+                          </m:sSub>
+                        </m:e>
+                      </m:d>
+                    </m:oMath>
+                  </m:oMathPara>
+                </a14:m>
+                <a:endParaRPr lang="en-US" b="0" dirty="0" smtClean="0"/>
+              </a:p>
+              <a:p>
+                <a14:m>
+                  <m:oMathPara xmlns:m="http://schemas.openxmlformats.org/officeDocument/2006/math">
+                    <m:oMathParaPr>
+                      <m:jc m:val="centerGroup"/>
+                    </m:oMathParaPr>
+                    <m:oMath xmlns:m="http://schemas.openxmlformats.org/officeDocument/2006/math">
+                      <m:r>
+                        <a:rPr lang="en-US" b="1" i="1" smtClean="0">
+                          <a:latin typeface="Cambria Math" panose="02040503050406030204" pitchFamily="18" charset="0"/>
+                        </a:rPr>
+                        <m:t>𝒄</m:t>
+                      </m:r>
+                      <m:r>
+                        <a:rPr lang="en-US" b="1" i="1" smtClean="0">
+                          <a:latin typeface="Cambria Math" panose="02040503050406030204" pitchFamily="18" charset="0"/>
+                        </a:rPr>
+                        <m:t>=(</m:t>
+                      </m:r>
+                      <m:sSub>
+                        <m:sSubPr>
+                          <m:ctrlPr>
+                            <a:rPr lang="en-US" i="1" smtClean="0">
+                              <a:latin typeface="Cambria Math" panose="02040503050406030204" pitchFamily="18" charset="0"/>
+                            </a:rPr>
+                          </m:ctrlPr>
+                        </m:sSubPr>
+                        <m:e>
+                          <m:r>
+                            <a:rPr lang="en-US" b="0" i="1" smtClean="0">
+                              <a:latin typeface="Cambria Math" panose="02040503050406030204" pitchFamily="18" charset="0"/>
+                            </a:rPr>
+                            <m:t>𝑐</m:t>
+                          </m:r>
+                        </m:e>
+                        <m:sub>
+                          <m:r>
+                            <a:rPr lang="en-US" b="0" i="1" smtClean="0">
+                              <a:latin typeface="Cambria Math" panose="02040503050406030204" pitchFamily="18" charset="0"/>
+                            </a:rPr>
+                            <m:t>1</m:t>
+                          </m:r>
+                        </m:sub>
+                      </m:sSub>
+                      <m:r>
+                        <a:rPr lang="en-US" b="0" i="1" smtClean="0">
+                          <a:latin typeface="Cambria Math" panose="02040503050406030204" pitchFamily="18" charset="0"/>
+                        </a:rPr>
+                        <m:t>, </m:t>
+                      </m:r>
+                      <m:sSub>
+                        <m:sSubPr>
+                          <m:ctrlPr>
+                            <a:rPr lang="en-US" b="0" i="1" smtClean="0">
+                              <a:latin typeface="Cambria Math" panose="02040503050406030204" pitchFamily="18" charset="0"/>
+                            </a:rPr>
+                          </m:ctrlPr>
+                        </m:sSubPr>
+                        <m:e>
+                          <m:r>
+                            <a:rPr lang="en-US" b="0" i="1" smtClean="0">
+                              <a:latin typeface="Cambria Math" panose="02040503050406030204" pitchFamily="18" charset="0"/>
+                            </a:rPr>
+                            <m:t>𝑐</m:t>
+                          </m:r>
+                        </m:e>
+                        <m:sub>
+                          <m:r>
+                            <a:rPr lang="en-US" b="0" i="1" smtClean="0">
+                              <a:latin typeface="Cambria Math" panose="02040503050406030204" pitchFamily="18" charset="0"/>
+                            </a:rPr>
+                            <m:t>2</m:t>
+                          </m:r>
+                        </m:sub>
+                      </m:sSub>
+                      <m:r>
+                        <a:rPr lang="en-US" b="0" i="1" smtClean="0">
+                          <a:latin typeface="Cambria Math" panose="02040503050406030204" pitchFamily="18" charset="0"/>
+                        </a:rPr>
+                        <m:t>,…, </m:t>
+                      </m:r>
+                      <m:sSub>
+                        <m:sSubPr>
+                          <m:ctrlPr>
+                            <a:rPr lang="en-US" b="0" i="1" smtClean="0">
+                              <a:latin typeface="Cambria Math" panose="02040503050406030204" pitchFamily="18" charset="0"/>
+                            </a:rPr>
+                          </m:ctrlPr>
+                        </m:sSubPr>
+                        <m:e>
+                          <m:r>
+                            <a:rPr lang="en-US" b="0" i="1" smtClean="0">
+                              <a:latin typeface="Cambria Math" panose="02040503050406030204" pitchFamily="18" charset="0"/>
+                            </a:rPr>
+                            <m:t>𝑐</m:t>
+                          </m:r>
+                        </m:e>
+                        <m:sub>
+                          <m:r>
+                            <a:rPr lang="en-US" b="0" i="1" smtClean="0">
+                              <a:latin typeface="Cambria Math" panose="02040503050406030204" pitchFamily="18" charset="0"/>
+                            </a:rPr>
+                            <m:t>𝑚</m:t>
+                          </m:r>
+                          <m:r>
+                            <a:rPr lang="en-US" b="0" i="1" smtClean="0">
+                              <a:latin typeface="Cambria Math" panose="02040503050406030204" pitchFamily="18" charset="0"/>
+                            </a:rPr>
+                            <m:t>−1</m:t>
+                          </m:r>
+                        </m:sub>
+                      </m:sSub>
+                      <m:r>
+                        <a:rPr lang="en-US" b="0" i="1" smtClean="0">
+                          <a:latin typeface="Cambria Math" panose="02040503050406030204" pitchFamily="18" charset="0"/>
+                        </a:rPr>
+                        <m:t>, </m:t>
+                      </m:r>
+                      <m:sSub>
+                        <m:sSubPr>
+                          <m:ctrlPr>
+                            <a:rPr lang="en-US" b="0" i="1" smtClean="0">
+                              <a:latin typeface="Cambria Math" panose="02040503050406030204" pitchFamily="18" charset="0"/>
+                            </a:rPr>
+                          </m:ctrlPr>
+                        </m:sSubPr>
+                        <m:e>
+                          <m:r>
+                            <a:rPr lang="en-US" b="0" i="1" smtClean="0">
+                              <a:latin typeface="Cambria Math" panose="02040503050406030204" pitchFamily="18" charset="0"/>
+                            </a:rPr>
+                            <m:t>𝑐</m:t>
+                          </m:r>
+                        </m:e>
+                        <m:sub>
+                          <m:r>
+                            <a:rPr lang="en-US" b="0" i="1" smtClean="0">
+                              <a:latin typeface="Cambria Math" panose="02040503050406030204" pitchFamily="18" charset="0"/>
+                            </a:rPr>
+                            <m:t>𝑚</m:t>
+                          </m:r>
+                        </m:sub>
+                      </m:sSub>
+                      <m:r>
+                        <a:rPr lang="en-US" b="0" i="1" smtClean="0">
+                          <a:latin typeface="Cambria Math" panose="02040503050406030204" pitchFamily="18" charset="0"/>
+                        </a:rPr>
+                        <m:t>)</m:t>
+                      </m:r>
+                    </m:oMath>
+                  </m:oMathPara>
+                </a14:m>
+                <a:endParaRPr lang="en-US" dirty="0" smtClean="0"/>
+              </a:p>
+              <a:p>
+                <a:pPr algn="ctr"/>
+                <a14:m>
+                  <m:oMath xmlns:m="http://schemas.openxmlformats.org/officeDocument/2006/math">
+                    <m:r>
+                      <a:rPr lang="en-US" b="0" i="1" smtClean="0">
+                        <a:latin typeface="Cambria Math" panose="02040503050406030204" pitchFamily="18" charset="0"/>
+                      </a:rPr>
+                      <m:t>𝑝</m:t>
+                    </m:r>
+                    <m:d>
+                      <m:dPr>
+                        <m:ctrlPr>
+                          <a:rPr lang="en-US" b="0" i="1" smtClean="0">
+                            <a:latin typeface="Cambria Math" panose="02040503050406030204" pitchFamily="18" charset="0"/>
+                          </a:rPr>
+                        </m:ctrlPr>
+                      </m:dPr>
+                      <m:e>
+                        <m:r>
+                          <a:rPr lang="en-US" b="1" i="1" smtClean="0">
+                            <a:latin typeface="Cambria Math" panose="02040503050406030204" pitchFamily="18" charset="0"/>
+                          </a:rPr>
+                          <m:t>𝒄</m:t>
+                        </m:r>
+                        <m:r>
+                          <a:rPr lang="en-US" b="0" i="1" smtClean="0">
+                            <a:latin typeface="Cambria Math" panose="02040503050406030204" pitchFamily="18" charset="0"/>
+                          </a:rPr>
+                          <m:t>|</m:t>
+                        </m:r>
+                        <m:r>
+                          <a:rPr lang="en-US" b="1" i="1" smtClean="0">
+                            <a:latin typeface="Cambria Math" panose="02040503050406030204" pitchFamily="18" charset="0"/>
+                          </a:rPr>
+                          <m:t>𝒖</m:t>
+                        </m:r>
+                      </m:e>
+                    </m:d>
+                    <m:r>
+                      <a:rPr lang="en-US" b="0" i="0" smtClean="0">
+                        <a:latin typeface="Cambria Math" panose="02040503050406030204" pitchFamily="18" charset="0"/>
+                      </a:rPr>
+                      <m:t>=</m:t>
+                    </m:r>
+                    <m:r>
+                      <m:rPr>
+                        <m:sty m:val="p"/>
+                      </m:rPr>
+                      <a:rPr lang="en-US" b="0" i="0" smtClean="0">
+                        <a:latin typeface="Cambria Math" panose="02040503050406030204" pitchFamily="18" charset="0"/>
+                      </a:rPr>
+                      <m:t>p</m:t>
+                    </m:r>
+                    <m:d>
+                      <m:dPr>
+                        <m:ctrlPr>
+                          <a:rPr lang="en-US" b="0" i="0" smtClean="0">
+                            <a:latin typeface="Cambria Math" panose="02040503050406030204" pitchFamily="18" charset="0"/>
+                          </a:rPr>
+                        </m:ctrlPr>
+                      </m:dPr>
+                      <m:e>
+                        <m:sSub>
+                          <m:sSubPr>
+                            <m:ctrlPr>
+                              <a:rPr lang="en-US" i="0" smtClean="0">
+                                <a:latin typeface="Cambria Math" panose="02040503050406030204" pitchFamily="18" charset="0"/>
+                              </a:rPr>
+                            </m:ctrlPr>
+                          </m:sSubPr>
+                          <m:e>
+                            <m:r>
+                              <m:rPr>
+                                <m:sty m:val="p"/>
+                              </m:rPr>
+                              <a:rPr lang="en-US" b="0" i="0" smtClean="0">
+                                <a:latin typeface="Cambria Math" panose="02040503050406030204" pitchFamily="18" charset="0"/>
+                              </a:rPr>
+                              <m:t>c</m:t>
+                            </m:r>
+                          </m:e>
+                          <m:sub>
+                            <m:r>
+                              <a:rPr lang="en-US" b="0" i="0" smtClean="0">
+                                <a:latin typeface="Cambria Math" panose="02040503050406030204" pitchFamily="18" charset="0"/>
+                              </a:rPr>
+                              <m:t>1</m:t>
+                            </m:r>
+                          </m:sub>
+                        </m:sSub>
+                        <m:r>
+                          <a:rPr lang="en-US" b="1" i="0" smtClean="0">
+                            <a:latin typeface="Cambria Math" panose="02040503050406030204" pitchFamily="18" charset="0"/>
+                          </a:rPr>
+                          <m:t>|</m:t>
+                        </m:r>
+                        <m:r>
+                          <a:rPr lang="en-US" b="1" i="0" smtClean="0">
+                            <a:latin typeface="Cambria Math" panose="02040503050406030204" pitchFamily="18" charset="0"/>
+                          </a:rPr>
+                          <m:t>𝐮</m:t>
+                        </m:r>
+                      </m:e>
+                    </m:d>
+                    <m:r>
+                      <a:rPr lang="en-US" b="1" i="0" smtClean="0">
+                        <a:latin typeface="Cambria Math" panose="02040503050406030204" pitchFamily="18" charset="0"/>
+                      </a:rPr>
+                      <m:t>∗</m:t>
+                    </m:r>
+                    <m:r>
+                      <m:rPr>
+                        <m:sty m:val="p"/>
+                      </m:rPr>
+                      <a:rPr lang="en-US">
+                        <a:latin typeface="Cambria Math" panose="02040503050406030204" pitchFamily="18" charset="0"/>
+                      </a:rPr>
+                      <m:t>p</m:t>
+                    </m:r>
+                    <m:d>
+                      <m:dPr>
+                        <m:ctrlPr>
+                          <a:rPr lang="en-US" i="1">
+                            <a:latin typeface="Cambria Math" panose="02040503050406030204" pitchFamily="18" charset="0"/>
+                          </a:rPr>
+                        </m:ctrlPr>
+                      </m:dPr>
+                      <m:e>
+                        <m:sSub>
+                          <m:sSubPr>
+                            <m:ctrlPr>
+                              <a:rPr lang="en-US" b="0" i="1" smtClean="0">
+                                <a:latin typeface="Cambria Math" panose="02040503050406030204" pitchFamily="18" charset="0"/>
+                              </a:rPr>
+                            </m:ctrlPr>
+                          </m:sSubPr>
+                          <m:e>
+                            <m:r>
+                              <a:rPr lang="en-US" b="0" i="1" smtClean="0">
+                                <a:latin typeface="Cambria Math" panose="02040503050406030204" pitchFamily="18" charset="0"/>
+                              </a:rPr>
+                              <m:t>𝑐</m:t>
+                            </m:r>
+                          </m:e>
+                          <m:sub>
+                            <m:r>
+                              <a:rPr lang="en-US" b="0" i="1" smtClean="0">
+                                <a:latin typeface="Cambria Math" panose="02040503050406030204" pitchFamily="18" charset="0"/>
+                              </a:rPr>
+                              <m:t>2</m:t>
+                            </m:r>
+                          </m:sub>
+                        </m:sSub>
+                        <m:r>
+                          <a:rPr lang="en-US" b="0" i="1" smtClean="0">
+                            <a:latin typeface="Cambria Math" panose="02040503050406030204" pitchFamily="18" charset="0"/>
+                          </a:rPr>
+                          <m:t>|</m:t>
+                        </m:r>
+                        <m:r>
+                          <a:rPr lang="en-US" b="1" i="1" smtClean="0">
+                            <a:latin typeface="Cambria Math" panose="02040503050406030204" pitchFamily="18" charset="0"/>
+                          </a:rPr>
+                          <m:t>𝒖</m:t>
+                        </m:r>
+                      </m:e>
+                    </m:d>
+                  </m:oMath>
+                </a14:m>
+                <a:r>
+                  <a:rPr lang="en-US" dirty="0" smtClean="0"/>
+                  <a:t>*</a:t>
+                </a:r>
+                <a14:m>
+                  <m:oMath xmlns:m="http://schemas.openxmlformats.org/officeDocument/2006/math">
+                    <m:r>
+                      <a:rPr lang="en-US" b="0" i="0" smtClean="0">
+                        <a:latin typeface="Cambria Math" panose="02040503050406030204" pitchFamily="18" charset="0"/>
+                      </a:rPr>
+                      <m:t>….∗</m:t>
+                    </m:r>
+                    <m:r>
+                      <m:rPr>
+                        <m:sty m:val="p"/>
+                      </m:rPr>
+                      <a:rPr lang="en-US">
+                        <a:latin typeface="Cambria Math" panose="02040503050406030204" pitchFamily="18" charset="0"/>
+                      </a:rPr>
+                      <m:t>p</m:t>
+                    </m:r>
+                    <m:d>
+                      <m:dPr>
+                        <m:ctrlPr>
+                          <a:rPr lang="en-US" i="1">
+                            <a:latin typeface="Cambria Math" panose="02040503050406030204" pitchFamily="18" charset="0"/>
+                          </a:rPr>
+                        </m:ctrlPr>
+                      </m:dPr>
+                      <m:e>
+                        <m:sSub>
+                          <m:sSubPr>
+                            <m:ctrlPr>
+                              <a:rPr lang="en-US" b="0" i="1" smtClean="0">
+                                <a:latin typeface="Cambria Math" panose="02040503050406030204" pitchFamily="18" charset="0"/>
+                              </a:rPr>
+                            </m:ctrlPr>
+                          </m:sSubPr>
+                          <m:e>
+                            <m:r>
+                              <a:rPr lang="en-US" b="0" i="1" smtClean="0">
+                                <a:latin typeface="Cambria Math" panose="02040503050406030204" pitchFamily="18" charset="0"/>
+                              </a:rPr>
+                              <m:t>𝑐</m:t>
+                            </m:r>
+                          </m:e>
+                          <m:sub>
+                            <m:r>
+                              <a:rPr lang="en-US" b="0" i="1" smtClean="0">
+                                <a:latin typeface="Cambria Math" panose="02040503050406030204" pitchFamily="18" charset="0"/>
+                              </a:rPr>
+                              <m:t>𝑚</m:t>
+                            </m:r>
+                            <m:r>
+                              <a:rPr lang="en-US" b="0" i="1" smtClean="0">
+                                <a:latin typeface="Cambria Math" panose="02040503050406030204" pitchFamily="18" charset="0"/>
+                              </a:rPr>
+                              <m:t>−1</m:t>
+                            </m:r>
+                          </m:sub>
+                        </m:sSub>
+                        <m:r>
+                          <a:rPr lang="en-US" b="0" i="1" smtClean="0">
+                            <a:latin typeface="Cambria Math" panose="02040503050406030204" pitchFamily="18" charset="0"/>
+                          </a:rPr>
+                          <m:t>|</m:t>
+                        </m:r>
+                        <m:r>
+                          <a:rPr lang="en-US" b="1" i="1" smtClean="0">
+                            <a:latin typeface="Cambria Math" panose="02040503050406030204" pitchFamily="18" charset="0"/>
+                          </a:rPr>
+                          <m:t>𝒖</m:t>
+                        </m:r>
+                      </m:e>
+                    </m:d>
+                  </m:oMath>
+                </a14:m>
+                <a:r>
+                  <a:rPr lang="en-US" dirty="0" smtClean="0"/>
+                  <a:t>*</a:t>
+                </a:r>
+                <a14:m>
+                  <m:oMath xmlns:m="http://schemas.openxmlformats.org/officeDocument/2006/math">
+                    <m:r>
+                      <m:rPr>
+                        <m:sty m:val="p"/>
+                      </m:rPr>
+                      <a:rPr lang="en-US">
+                        <a:latin typeface="Cambria Math" panose="02040503050406030204" pitchFamily="18" charset="0"/>
+                      </a:rPr>
+                      <m:t>p</m:t>
+                    </m:r>
+                    <m:d>
+                      <m:dPr>
+                        <m:ctrlPr>
+                          <a:rPr lang="en-US" i="1">
+                            <a:latin typeface="Cambria Math" panose="02040503050406030204" pitchFamily="18" charset="0"/>
+                          </a:rPr>
+                        </m:ctrlPr>
+                      </m:dPr>
+                      <m:e>
+                        <m:sSub>
+                          <m:sSubPr>
+                            <m:ctrlPr>
+                              <a:rPr lang="en-US" b="0" i="1" smtClean="0">
+                                <a:latin typeface="Cambria Math" panose="02040503050406030204" pitchFamily="18" charset="0"/>
+                              </a:rPr>
+                            </m:ctrlPr>
+                          </m:sSubPr>
+                          <m:e>
+                            <m:r>
+                              <a:rPr lang="en-US" b="0" i="1" smtClean="0">
+                                <a:latin typeface="Cambria Math" panose="02040503050406030204" pitchFamily="18" charset="0"/>
+                              </a:rPr>
+                              <m:t>𝑐</m:t>
+                            </m:r>
+                          </m:e>
+                          <m:sub>
+                            <m:r>
+                              <a:rPr lang="en-US" b="0" i="1" smtClean="0">
+                                <a:latin typeface="Cambria Math" panose="02040503050406030204" pitchFamily="18" charset="0"/>
+                              </a:rPr>
+                              <m:t>𝑚</m:t>
+                            </m:r>
+                          </m:sub>
+                        </m:sSub>
+                        <m:r>
+                          <a:rPr lang="en-US" b="0" i="1" smtClean="0">
+                            <a:latin typeface="Cambria Math" panose="02040503050406030204" pitchFamily="18" charset="0"/>
+                          </a:rPr>
+                          <m:t>|</m:t>
+                        </m:r>
+                        <m:r>
+                          <a:rPr lang="en-US" b="1" i="1" smtClean="0">
+                            <a:latin typeface="Cambria Math" panose="02040503050406030204" pitchFamily="18" charset="0"/>
+                          </a:rPr>
+                          <m:t>𝒖</m:t>
+                        </m:r>
+                      </m:e>
+                    </m:d>
+                  </m:oMath>
+                </a14:m>
+                <a:endParaRPr lang="en-US" b="1" dirty="0" smtClean="0"/>
+              </a:p>
+              <a:p>
+                <a14:m>
+                  <m:oMathPara xmlns:m="http://schemas.openxmlformats.org/officeDocument/2006/math">
+                    <m:oMathParaPr>
+                      <m:jc m:val="centerGroup"/>
+                    </m:oMathParaPr>
+                    <m:oMath xmlns:m="http://schemas.openxmlformats.org/officeDocument/2006/math">
+                      <m:r>
+                        <a:rPr lang="en-US" b="0" i="1" smtClean="0">
+                          <a:latin typeface="Cambria Math" panose="02040503050406030204" pitchFamily="18" charset="0"/>
+                        </a:rPr>
+                        <m:t>𝑝</m:t>
+                      </m:r>
+                      <m:r>
+                        <a:rPr lang="en-US" b="0" i="1" smtClean="0">
+                          <a:latin typeface="Cambria Math" panose="02040503050406030204" pitchFamily="18" charset="0"/>
+                        </a:rPr>
+                        <m:t>(</m:t>
+                      </m:r>
+                      <m:sSub>
+                        <m:sSubPr>
+                          <m:ctrlPr>
+                            <a:rPr lang="en-US" b="0" i="1" smtClean="0">
+                              <a:latin typeface="Cambria Math" panose="02040503050406030204" pitchFamily="18" charset="0"/>
+                            </a:rPr>
+                          </m:ctrlPr>
+                        </m:sSubPr>
+                        <m:e>
+                          <m:r>
+                            <a:rPr lang="en-US" b="0" i="1" smtClean="0">
+                              <a:latin typeface="Cambria Math" panose="02040503050406030204" pitchFamily="18" charset="0"/>
+                            </a:rPr>
+                            <m:t>𝑐</m:t>
+                          </m:r>
+                        </m:e>
+                        <m:sub>
+                          <m:r>
+                            <a:rPr lang="en-US" b="0" i="1" smtClean="0">
+                              <a:latin typeface="Cambria Math" panose="02040503050406030204" pitchFamily="18" charset="0"/>
+                            </a:rPr>
+                            <m:t>1</m:t>
+                          </m:r>
+                        </m:sub>
+                      </m:sSub>
+                      <m:r>
+                        <a:rPr lang="en-US" b="0" i="1" smtClean="0">
+                          <a:latin typeface="Cambria Math" panose="02040503050406030204" pitchFamily="18" charset="0"/>
+                        </a:rPr>
+                        <m:t>|</m:t>
+                      </m:r>
+                      <m:r>
+                        <a:rPr lang="en-US" b="1" i="1" smtClean="0">
+                          <a:latin typeface="Cambria Math" panose="02040503050406030204" pitchFamily="18" charset="0"/>
+                        </a:rPr>
+                        <m:t>𝒖</m:t>
+                      </m:r>
+                      <m:r>
+                        <a:rPr lang="en-US" b="0" i="1" smtClean="0">
+                          <a:latin typeface="Cambria Math" panose="02040503050406030204" pitchFamily="18" charset="0"/>
+                        </a:rPr>
+                        <m:t>)=</m:t>
+                      </m:r>
+                      <m:r>
+                        <a:rPr lang="en-US" b="0" i="1" smtClean="0">
+                          <a:latin typeface="Cambria Math" panose="02040503050406030204" pitchFamily="18" charset="0"/>
+                        </a:rPr>
+                        <m:t>𝑝</m:t>
+                      </m:r>
+                      <m:d>
+                        <m:dPr>
+                          <m:ctrlPr>
+                            <a:rPr lang="en-US" b="0" i="1" smtClean="0">
+                              <a:latin typeface="Cambria Math" panose="02040503050406030204" pitchFamily="18" charset="0"/>
+                            </a:rPr>
+                          </m:ctrlPr>
+                        </m:dPr>
+                        <m:e>
+                          <m:sSub>
+                            <m:sSubPr>
+                              <m:ctrlPr>
+                                <a:rPr lang="en-US" b="0" i="1" smtClean="0">
+                                  <a:latin typeface="Cambria Math" panose="02040503050406030204" pitchFamily="18" charset="0"/>
+                                </a:rPr>
+                              </m:ctrlPr>
+                            </m:sSubPr>
+                            <m:e>
+                              <m:r>
+                                <a:rPr lang="en-US" b="0" i="1" smtClean="0">
+                                  <a:latin typeface="Cambria Math" panose="02040503050406030204" pitchFamily="18" charset="0"/>
+                                </a:rPr>
+                                <m:t>𝑐</m:t>
+                              </m:r>
+                            </m:e>
+                            <m:sub>
+                              <m:r>
+                                <a:rPr lang="en-US" b="0" i="1" smtClean="0">
+                                  <a:latin typeface="Cambria Math" panose="02040503050406030204" pitchFamily="18" charset="0"/>
+                                </a:rPr>
+                                <m:t>1</m:t>
+                              </m:r>
+                            </m:sub>
+                          </m:sSub>
+                        </m:e>
+                      </m:d>
+                      <m:r>
+                        <a:rPr lang="en-US" b="0" i="1" smtClean="0">
+                          <a:latin typeface="Cambria Math" panose="02040503050406030204" pitchFamily="18" charset="0"/>
+                        </a:rPr>
+                        <m:t>∗</m:t>
+                      </m:r>
+                      <m:r>
+                        <a:rPr lang="en-US" b="0" i="1" smtClean="0">
+                          <a:latin typeface="Cambria Math" panose="02040503050406030204" pitchFamily="18" charset="0"/>
+                        </a:rPr>
+                        <m:t>𝑝</m:t>
+                      </m:r>
+                      <m:r>
+                        <a:rPr lang="en-US" b="0" i="1" smtClean="0">
+                          <a:latin typeface="Cambria Math" panose="02040503050406030204" pitchFamily="18" charset="0"/>
+                        </a:rPr>
+                        <m:t>(</m:t>
+                      </m:r>
+                      <m:r>
+                        <a:rPr lang="en-US" b="1" i="1" smtClean="0">
+                          <a:latin typeface="Cambria Math" panose="02040503050406030204" pitchFamily="18" charset="0"/>
+                        </a:rPr>
+                        <m:t>𝒖</m:t>
+                      </m:r>
+                      <m:r>
+                        <a:rPr lang="en-US" b="1" i="1" smtClean="0">
+                          <a:latin typeface="Cambria Math" panose="02040503050406030204" pitchFamily="18" charset="0"/>
+                        </a:rPr>
+                        <m:t>|</m:t>
+                      </m:r>
+                      <m:sSub>
+                        <m:sSubPr>
+                          <m:ctrlPr>
+                            <a:rPr lang="en-US" i="1" smtClean="0">
+                              <a:latin typeface="Cambria Math" panose="02040503050406030204" pitchFamily="18" charset="0"/>
+                            </a:rPr>
+                          </m:ctrlPr>
+                        </m:sSubPr>
+                        <m:e>
+                          <m:r>
+                            <a:rPr lang="en-US" b="0" i="1" smtClean="0">
+                              <a:latin typeface="Cambria Math" panose="02040503050406030204" pitchFamily="18" charset="0"/>
+                            </a:rPr>
+                            <m:t>𝑐</m:t>
+                          </m:r>
+                        </m:e>
+                        <m:sub>
+                          <m:r>
+                            <a:rPr lang="en-US" b="0" i="1" smtClean="0">
+                              <a:latin typeface="Cambria Math" panose="02040503050406030204" pitchFamily="18" charset="0"/>
+                            </a:rPr>
+                            <m:t>1</m:t>
+                          </m:r>
+                        </m:sub>
+                      </m:sSub>
+                      <m:r>
+                        <a:rPr lang="en-US" b="0" i="1" smtClean="0">
+                          <a:latin typeface="Cambria Math" panose="02040503050406030204" pitchFamily="18" charset="0"/>
+                        </a:rPr>
+                        <m:t>)</m:t>
+                      </m:r>
+                    </m:oMath>
+                  </m:oMathPara>
+                </a14:m>
+                <a:endParaRPr lang="en-US" b="1" dirty="0" smtClean="0"/>
+              </a:p>
+              <a:p>
+                <a14:m>
+                  <m:oMathPara xmlns:m="http://schemas.openxmlformats.org/officeDocument/2006/math">
+                    <m:oMathParaPr>
+                      <m:jc m:val="centerGroup"/>
+                    </m:oMathParaPr>
+                    <m:oMath xmlns:m="http://schemas.openxmlformats.org/officeDocument/2006/math">
+                      <m:r>
+                        <a:rPr lang="en-US" b="0" i="1" smtClean="0">
+                          <a:latin typeface="Cambria Math" panose="02040503050406030204" pitchFamily="18" charset="0"/>
+                        </a:rPr>
+                        <m:t>𝑝</m:t>
+                      </m:r>
+                      <m:d>
+                        <m:dPr>
+                          <m:ctrlPr>
+                            <a:rPr lang="en-US" b="1" i="1" smtClean="0">
+                              <a:latin typeface="Cambria Math" panose="02040503050406030204" pitchFamily="18" charset="0"/>
+                            </a:rPr>
+                          </m:ctrlPr>
+                        </m:dPr>
+                        <m:e>
+                          <m:r>
+                            <a:rPr lang="en-US" b="1" i="1" smtClean="0">
+                              <a:latin typeface="Cambria Math" panose="02040503050406030204" pitchFamily="18" charset="0"/>
+                            </a:rPr>
+                            <m:t>𝒖</m:t>
+                          </m:r>
+                          <m:r>
+                            <a:rPr lang="en-US" b="1" i="1" smtClean="0">
+                              <a:latin typeface="Cambria Math" panose="02040503050406030204" pitchFamily="18" charset="0"/>
+                            </a:rPr>
+                            <m:t>|</m:t>
+                          </m:r>
+                          <m:sSub>
+                            <m:sSubPr>
+                              <m:ctrlPr>
+                                <a:rPr lang="en-US" i="1" smtClean="0">
+                                  <a:latin typeface="Cambria Math" panose="02040503050406030204" pitchFamily="18" charset="0"/>
+                                </a:rPr>
+                              </m:ctrlPr>
+                            </m:sSubPr>
+                            <m:e>
+                              <m:r>
+                                <a:rPr lang="en-US" b="0" i="1" smtClean="0">
+                                  <a:latin typeface="Cambria Math" panose="02040503050406030204" pitchFamily="18" charset="0"/>
+                                </a:rPr>
+                                <m:t>𝑐</m:t>
+                              </m:r>
+                            </m:e>
+                            <m:sub>
+                              <m:r>
+                                <a:rPr lang="en-US" b="0" i="1" smtClean="0">
+                                  <a:latin typeface="Cambria Math" panose="02040503050406030204" pitchFamily="18" charset="0"/>
+                                </a:rPr>
+                                <m:t>1</m:t>
+                              </m:r>
+                            </m:sub>
+                          </m:sSub>
+                        </m:e>
+                      </m:d>
+                      <m:r>
+                        <a:rPr lang="en-US" b="1" i="1" smtClean="0">
+                          <a:latin typeface="Cambria Math" panose="02040503050406030204" pitchFamily="18" charset="0"/>
+                        </a:rPr>
+                        <m:t>=</m:t>
+                      </m:r>
+                      <m:r>
+                        <a:rPr lang="en-US" b="0" i="1" smtClean="0">
+                          <a:latin typeface="Cambria Math" panose="02040503050406030204" pitchFamily="18" charset="0"/>
+                        </a:rPr>
+                        <m:t>𝑝</m:t>
+                      </m:r>
+                      <m:d>
+                        <m:dPr>
+                          <m:ctrlPr>
+                            <a:rPr lang="en-US" b="0" i="1" smtClean="0">
+                              <a:latin typeface="Cambria Math" panose="02040503050406030204" pitchFamily="18" charset="0"/>
+                            </a:rPr>
+                          </m:ctrlPr>
+                        </m:dPr>
+                        <m:e>
+                          <m:sSub>
+                            <m:sSubPr>
+                              <m:ctrlPr>
+                                <a:rPr lang="en-US" b="0" i="1" smtClean="0">
+                                  <a:latin typeface="Cambria Math" panose="02040503050406030204" pitchFamily="18" charset="0"/>
+                                </a:rPr>
+                              </m:ctrlPr>
+                            </m:sSubPr>
+                            <m:e>
+                              <m:r>
+                                <a:rPr lang="en-US" b="0" i="1" smtClean="0">
+                                  <a:latin typeface="Cambria Math" panose="02040503050406030204" pitchFamily="18" charset="0"/>
+                                </a:rPr>
+                                <m:t>𝑢</m:t>
+                              </m:r>
+                            </m:e>
+                            <m:sub>
+                              <m:r>
+                                <a:rPr lang="en-US" b="0" i="1" smtClean="0">
+                                  <a:latin typeface="Cambria Math" panose="02040503050406030204" pitchFamily="18" charset="0"/>
+                                </a:rPr>
+                                <m:t>1</m:t>
+                              </m:r>
+                            </m:sub>
+                          </m:sSub>
+                        </m:e>
+                        <m:e>
+                          <m:sSub>
+                            <m:sSubPr>
+                              <m:ctrlPr>
+                                <a:rPr lang="en-US" b="0" i="1" smtClean="0">
+                                  <a:latin typeface="Cambria Math" panose="02040503050406030204" pitchFamily="18" charset="0"/>
+                                </a:rPr>
+                              </m:ctrlPr>
+                            </m:sSubPr>
+                            <m:e>
+                              <m:r>
+                                <a:rPr lang="en-US" b="0" i="1" smtClean="0">
+                                  <a:latin typeface="Cambria Math" panose="02040503050406030204" pitchFamily="18" charset="0"/>
+                                </a:rPr>
+                                <m:t>𝑐</m:t>
+                              </m:r>
+                            </m:e>
+                            <m:sub>
+                              <m:r>
+                                <a:rPr lang="en-US" b="0" i="1" smtClean="0">
+                                  <a:latin typeface="Cambria Math" panose="02040503050406030204" pitchFamily="18" charset="0"/>
+                                </a:rPr>
+                                <m:t>1</m:t>
+                              </m:r>
+                            </m:sub>
+                          </m:sSub>
+                        </m:e>
+                      </m:d>
+                      <m:r>
+                        <a:rPr lang="en-US" b="0" i="1" smtClean="0">
+                          <a:latin typeface="Cambria Math" panose="02040503050406030204" pitchFamily="18" charset="0"/>
+                        </a:rPr>
+                        <m:t>∗</m:t>
+                      </m:r>
+                      <m:r>
+                        <a:rPr lang="en-US" b="0" i="1" smtClean="0">
+                          <a:latin typeface="Cambria Math" panose="02040503050406030204" pitchFamily="18" charset="0"/>
+                        </a:rPr>
+                        <m:t>𝑝</m:t>
+                      </m:r>
+                      <m:d>
+                        <m:dPr>
+                          <m:ctrlPr>
+                            <a:rPr lang="en-US" b="0" i="1" smtClean="0">
+                              <a:latin typeface="Cambria Math" panose="02040503050406030204" pitchFamily="18" charset="0"/>
+                            </a:rPr>
+                          </m:ctrlPr>
+                        </m:dPr>
+                        <m:e>
+                          <m:sSub>
+                            <m:sSubPr>
+                              <m:ctrlPr>
+                                <a:rPr lang="en-US" b="0" i="1" smtClean="0">
+                                  <a:latin typeface="Cambria Math" panose="02040503050406030204" pitchFamily="18" charset="0"/>
+                                </a:rPr>
+                              </m:ctrlPr>
+                            </m:sSubPr>
+                            <m:e>
+                              <m:r>
+                                <a:rPr lang="en-US" b="0" i="1" smtClean="0">
+                                  <a:latin typeface="Cambria Math" panose="02040503050406030204" pitchFamily="18" charset="0"/>
+                                </a:rPr>
+                                <m:t>𝑢</m:t>
+                              </m:r>
+                            </m:e>
+                            <m:sub>
+                              <m:r>
+                                <a:rPr lang="en-US" b="0" i="1" smtClean="0">
+                                  <a:latin typeface="Cambria Math" panose="02040503050406030204" pitchFamily="18" charset="0"/>
+                                </a:rPr>
+                                <m:t>2</m:t>
+                              </m:r>
+                            </m:sub>
+                          </m:sSub>
+                        </m:e>
+                        <m:e>
+                          <m:sSub>
+                            <m:sSubPr>
+                              <m:ctrlPr>
+                                <a:rPr lang="en-US" b="0" i="1" smtClean="0">
+                                  <a:latin typeface="Cambria Math" panose="02040503050406030204" pitchFamily="18" charset="0"/>
+                                </a:rPr>
+                              </m:ctrlPr>
+                            </m:sSubPr>
+                            <m:e>
+                              <m:r>
+                                <a:rPr lang="en-US" b="0" i="1" smtClean="0">
+                                  <a:latin typeface="Cambria Math" panose="02040503050406030204" pitchFamily="18" charset="0"/>
+                                </a:rPr>
+                                <m:t>𝑐</m:t>
+                              </m:r>
+                            </m:e>
+                            <m:sub>
+                              <m:r>
+                                <a:rPr lang="en-US" b="0" i="1" smtClean="0">
+                                  <a:latin typeface="Cambria Math" panose="02040503050406030204" pitchFamily="18" charset="0"/>
+                                </a:rPr>
+                                <m:t>1</m:t>
+                              </m:r>
+                            </m:sub>
+                          </m:sSub>
+                        </m:e>
+                      </m:d>
+                      <m:r>
+                        <a:rPr lang="en-US" b="0" i="1" smtClean="0">
+                          <a:latin typeface="Cambria Math" panose="02040503050406030204" pitchFamily="18" charset="0"/>
+                        </a:rPr>
+                        <m:t>∗</m:t>
+                      </m:r>
+                      <m:r>
+                        <a:rPr lang="en-US" b="0" i="1" smtClean="0">
+                          <a:latin typeface="Cambria Math" panose="02040503050406030204" pitchFamily="18" charset="0"/>
+                        </a:rPr>
+                        <m:t>𝑝</m:t>
+                      </m:r>
+                      <m:d>
+                        <m:dPr>
+                          <m:ctrlPr>
+                            <a:rPr lang="en-US" b="0" i="1" smtClean="0">
+                              <a:latin typeface="Cambria Math" panose="02040503050406030204" pitchFamily="18" charset="0"/>
+                            </a:rPr>
+                          </m:ctrlPr>
+                        </m:dPr>
+                        <m:e>
+                          <m:sSub>
+                            <m:sSubPr>
+                              <m:ctrlPr>
+                                <a:rPr lang="en-US" b="0" i="1" smtClean="0">
+                                  <a:latin typeface="Cambria Math" panose="02040503050406030204" pitchFamily="18" charset="0"/>
+                                </a:rPr>
+                              </m:ctrlPr>
+                            </m:sSubPr>
+                            <m:e>
+                              <m:r>
+                                <a:rPr lang="en-US" b="0" i="1" smtClean="0">
+                                  <a:latin typeface="Cambria Math" panose="02040503050406030204" pitchFamily="18" charset="0"/>
+                                </a:rPr>
+                                <m:t>𝑢</m:t>
+                              </m:r>
+                            </m:e>
+                            <m:sub>
+                              <m:r>
+                                <a:rPr lang="en-US" b="0" i="1" smtClean="0">
+                                  <a:latin typeface="Cambria Math" panose="02040503050406030204" pitchFamily="18" charset="0"/>
+                                </a:rPr>
+                                <m:t>3</m:t>
+                              </m:r>
+                            </m:sub>
+                          </m:sSub>
+                        </m:e>
+                        <m:e>
+                          <m:sSub>
+                            <m:sSubPr>
+                              <m:ctrlPr>
+                                <a:rPr lang="en-US" b="0" i="1" smtClean="0">
+                                  <a:latin typeface="Cambria Math" panose="02040503050406030204" pitchFamily="18" charset="0"/>
+                                </a:rPr>
+                              </m:ctrlPr>
+                            </m:sSubPr>
+                            <m:e>
+                              <m:r>
+                                <a:rPr lang="en-US" b="0" i="1" smtClean="0">
+                                  <a:latin typeface="Cambria Math" panose="02040503050406030204" pitchFamily="18" charset="0"/>
+                                </a:rPr>
+                                <m:t>𝑐</m:t>
+                              </m:r>
+                            </m:e>
+                            <m:sub>
+                              <m:r>
+                                <a:rPr lang="en-US" b="0" i="1" smtClean="0">
+                                  <a:latin typeface="Cambria Math" panose="02040503050406030204" pitchFamily="18" charset="0"/>
+                                </a:rPr>
+                                <m:t>1</m:t>
+                              </m:r>
+                            </m:sub>
+                          </m:sSub>
+                        </m:e>
+                      </m:d>
+                      <m:r>
+                        <a:rPr lang="en-US" b="0" i="1" smtClean="0">
+                          <a:latin typeface="Cambria Math" panose="02040503050406030204" pitchFamily="18" charset="0"/>
+                        </a:rPr>
+                        <m:t>…</m:t>
+                      </m:r>
+                      <m:r>
+                        <a:rPr lang="en-US" b="0" i="1" smtClean="0">
+                          <a:latin typeface="Cambria Math" panose="02040503050406030204" pitchFamily="18" charset="0"/>
+                        </a:rPr>
+                        <m:t>𝑝</m:t>
+                      </m:r>
+                      <m:r>
+                        <a:rPr lang="en-US" b="0" i="1" smtClean="0">
+                          <a:latin typeface="Cambria Math" panose="02040503050406030204" pitchFamily="18" charset="0"/>
+                        </a:rPr>
+                        <m:t>(</m:t>
+                      </m:r>
+                      <m:sSub>
+                        <m:sSubPr>
+                          <m:ctrlPr>
+                            <a:rPr lang="en-US" b="0" i="1" smtClean="0">
+                              <a:latin typeface="Cambria Math" panose="02040503050406030204" pitchFamily="18" charset="0"/>
+                            </a:rPr>
+                          </m:ctrlPr>
+                        </m:sSubPr>
+                        <m:e>
+                          <m:r>
+                            <a:rPr lang="en-US" b="0" i="1" smtClean="0">
+                              <a:latin typeface="Cambria Math" panose="02040503050406030204" pitchFamily="18" charset="0"/>
+                            </a:rPr>
+                            <m:t>𝑢</m:t>
+                          </m:r>
+                        </m:e>
+                        <m:sub>
+                          <m:r>
+                            <a:rPr lang="en-US" b="0" i="1" smtClean="0">
+                              <a:latin typeface="Cambria Math" panose="02040503050406030204" pitchFamily="18" charset="0"/>
+                            </a:rPr>
+                            <m:t>𝑛</m:t>
+                          </m:r>
+                        </m:sub>
+                      </m:sSub>
+                      <m:r>
+                        <a:rPr lang="en-US" b="0" i="1" smtClean="0">
+                          <a:latin typeface="Cambria Math" panose="02040503050406030204" pitchFamily="18" charset="0"/>
+                        </a:rPr>
+                        <m:t>|</m:t>
+                      </m:r>
+                      <m:sSub>
+                        <m:sSubPr>
+                          <m:ctrlPr>
+                            <a:rPr lang="en-US" b="0" i="1" smtClean="0">
+                              <a:latin typeface="Cambria Math" panose="02040503050406030204" pitchFamily="18" charset="0"/>
+                            </a:rPr>
+                          </m:ctrlPr>
+                        </m:sSubPr>
+                        <m:e>
+                          <m:r>
+                            <a:rPr lang="en-US" b="0" i="1" smtClean="0">
+                              <a:latin typeface="Cambria Math" panose="02040503050406030204" pitchFamily="18" charset="0"/>
+                            </a:rPr>
+                            <m:t>𝑐</m:t>
+                          </m:r>
+                        </m:e>
+                        <m:sub>
+                          <m:r>
+                            <a:rPr lang="en-US" b="0" i="1" smtClean="0">
+                              <a:latin typeface="Cambria Math" panose="02040503050406030204" pitchFamily="18" charset="0"/>
+                            </a:rPr>
+                            <m:t>1</m:t>
+                          </m:r>
+                        </m:sub>
+                      </m:sSub>
+                      <m:r>
+                        <a:rPr lang="en-US" b="0" i="1" smtClean="0">
+                          <a:latin typeface="Cambria Math" panose="02040503050406030204" pitchFamily="18" charset="0"/>
+                        </a:rPr>
+                        <m:t>)</m:t>
+                      </m:r>
+                    </m:oMath>
+                  </m:oMathPara>
+                </a14:m>
+                <a:endParaRPr lang="en-US" dirty="0"/>
+              </a:p>
+            </p:txBody>
+          </p:sp>
+        </mc:Choice>
+        <mc:Fallback>
+          <p:sp>
+            <p:nvSpPr>
+              <p:cNvPr id="3" name="Rectangle 2"/>
+              <p:cNvSpPr>
+                <a:spLocks noRot="1" noChangeAspect="1" noMove="1" noResize="1" noEditPoints="1" noAdjustHandles="1" noChangeArrowheads="1" noChangeShapeType="1" noTextEdit="1"/>
+              </p:cNvSpPr>
+              <p:nvPr/>
+            </p:nvSpPr>
+            <p:spPr>
+              <a:xfrm>
+                <a:off x="304800" y="1752600"/>
+                <a:ext cx="8763000" cy="1477328"/>
+              </a:xfrm>
+              <a:prstGeom prst="rect">
+                <a:avLst/>
+              </a:prstGeom>
+              <a:blipFill rotWithShape="0">
+                <a:blip r:embed="rId2"/>
+                <a:stretch>
+                  <a:fillRect b="-2479"/>
+                </a:stretch>
+              </a:blipFill>
+            </p:spPr>
+            <p:txBody>
+              <a:bodyPr/>
+              <a:lstStyle/>
+              <a:p>
+                <a:r>
+                  <a:rPr lang="en-SG">
+                    <a:noFill/>
+                  </a:rPr>
+                  <a:t> </a:t>
+                </a:r>
+              </a:p>
+            </p:txBody>
+          </p:sp>
+        </mc:Fallback>
+      </mc:AlternateContent>
+    </p:spTree>
+    <p:extLst>
+      <p:ext uri="{BB962C8B-B14F-4D97-AF65-F5344CB8AC3E}">
+        <p14:creationId xmlns:p14="http://schemas.microsoft.com/office/powerpoint/2010/main" val="2064596415"/>
+      </p:ext>
+    </p:extLst>
+  </p:cSld>
+  <p:clrMapOvr>
+    <a:masterClrMapping/>
+  </p:clrMapOvr>
 </p:sld>
 </file>
 

</xml_diff>

<commit_message>
added code and result for fitting age to normal distribution
</commit_message>
<xml_diff>
--- a/exploratory_analysis.pptx
+++ b/exploratory_analysis.pptx
@@ -29,6 +29,7 @@
     <p:sldId id="278" r:id="rId23"/>
     <p:sldId id="279" r:id="rId24"/>
     <p:sldId id="280" r:id="rId25"/>
+    <p:sldId id="281" r:id="rId26"/>
   </p:sldIdLst>
   <p:sldSz cx="9144000" cy="6858000" type="screen4x3"/>
   <p:notesSz cx="6858000" cy="9144000"/>
@@ -3238,60 +3239,70 @@
       </p:sp>
       <p:pic>
         <p:nvPicPr>
-          <p:cNvPr id="1026" name="Picture 2"/>
+          <p:cNvPr id="6" name="Picture 5"/>
           <p:cNvPicPr>
-            <a:picLocks noGrp="1" noChangeAspect="1" noChangeArrowheads="1"/>
+            <a:picLocks noChangeAspect="1"/>
           </p:cNvPicPr>
-          <p:nvPr>
-            <p:ph idx="1"/>
-          </p:nvPr>
+          <p:nvPr/>
         </p:nvPicPr>
         <p:blipFill>
-          <a:blip r:embed="rId2">
-            <a:extLst>
-              <a:ext uri="{28A0092B-C50C-407E-A947-70E740481C1C}">
-                <a14:useLocalDpi xmlns:a14="http://schemas.microsoft.com/office/drawing/2010/main" val="0"/>
-              </a:ext>
-            </a:extLst>
-          </a:blip>
-          <a:srcRect/>
+          <a:blip r:embed="rId2"/>
           <a:stretch>
             <a:fillRect/>
           </a:stretch>
         </p:blipFill>
-        <p:spPr bwMode="auto">
+        <p:spPr>
           <a:xfrm>
-            <a:off x="2126693" y="2262617"/>
-            <a:ext cx="4890614" cy="3201129"/>
+            <a:off x="990600" y="1981200"/>
+            <a:ext cx="4928723" cy="3201129"/>
           </a:xfrm>
           <a:prstGeom prst="rect">
             <a:avLst/>
           </a:prstGeom>
-          <a:noFill/>
-          <a:ln>
-            <a:noFill/>
-          </a:ln>
-          <a:extLst>
-            <a:ext uri="{909E8E84-426E-40DD-AFC4-6F175D3DCCD1}">
-              <a14:hiddenFill xmlns:a14="http://schemas.microsoft.com/office/drawing/2010/main">
-                <a:solidFill>
-                  <a:schemeClr val="accent1"/>
-                </a:solidFill>
-              </a14:hiddenFill>
-            </a:ext>
-            <a:ext uri="{91240B29-F687-4F45-9708-019B960494DF}">
-              <a14:hiddenLine xmlns:a14="http://schemas.microsoft.com/office/drawing/2010/main" w="9525">
-                <a:solidFill>
-                  <a:schemeClr val="tx1"/>
-                </a:solidFill>
-                <a:miter lim="800000"/>
-                <a:headEnd/>
-                <a:tailEnd/>
-              </a14:hiddenLine>
-            </a:ext>
-          </a:extLst>
         </p:spPr>
       </p:pic>
+      <p:sp>
+        <p:nvSpPr>
+          <p:cNvPr id="5" name="Rectangle 4"/>
+          <p:cNvSpPr/>
+          <p:nvPr/>
+        </p:nvSpPr>
+        <p:spPr>
+          <a:xfrm>
+            <a:off x="5919323" y="2514600"/>
+            <a:ext cx="2523448" cy="646331"/>
+          </a:xfrm>
+          <a:prstGeom prst="rect">
+            <a:avLst/>
+          </a:prstGeom>
+        </p:spPr>
+        <p:txBody>
+          <a:bodyPr wrap="none">
+            <a:spAutoFit/>
+          </a:bodyPr>
+          <a:lstStyle/>
+          <a:p>
+            <a:r>
+              <a:rPr lang="en-SG" dirty="0" smtClean="0"/>
+              <a:t>Mean = 42.49, </a:t>
+            </a:r>
+          </a:p>
+          <a:p>
+            <a:r>
+              <a:rPr lang="en-SG" dirty="0"/>
+              <a:t> </a:t>
+            </a:r>
+            <a:r>
+              <a:rPr lang="en-SG" dirty="0" smtClean="0"/>
+              <a:t>  11.843206377890718</a:t>
+            </a:r>
+            <a:r>
+              <a:rPr lang="en-SG" dirty="0"/>
+              <a:t>)</a:t>
+            </a:r>
+          </a:p>
+        </p:txBody>
+      </p:sp>
     </p:spTree>
     <p:extLst>
       <p:ext uri="{BB962C8B-B14F-4D97-AF65-F5344CB8AC3E}">
@@ -3377,7 +3388,7 @@
         </p:blipFill>
         <p:spPr bwMode="auto">
           <a:xfrm>
-            <a:off x="2088584" y="2262617"/>
+            <a:off x="1371600" y="2209800"/>
             <a:ext cx="4966832" cy="3201129"/>
           </a:xfrm>
           <a:prstGeom prst="rect">
@@ -7380,6 +7391,59 @@
 </p:sld>
 </file>
 
+<file path=ppt/slides/slide25.xml><?xml version="1.0" encoding="utf-8"?>
+<p:sld xmlns:a="http://schemas.openxmlformats.org/drawingml/2006/main" xmlns:r="http://schemas.openxmlformats.org/officeDocument/2006/relationships" xmlns:p="http://schemas.openxmlformats.org/presentationml/2006/main">
+  <p:cSld>
+    <p:spTree>
+      <p:nvGrpSpPr>
+        <p:cNvPr id="1" name=""/>
+        <p:cNvGrpSpPr/>
+        <p:nvPr/>
+      </p:nvGrpSpPr>
+      <p:grpSpPr>
+        <a:xfrm>
+          <a:off x="0" y="0"/>
+          <a:ext cx="0" cy="0"/>
+          <a:chOff x="0" y="0"/>
+          <a:chExt cx="0" cy="0"/>
+        </a:xfrm>
+      </p:grpSpPr>
+      <p:sp>
+        <p:nvSpPr>
+          <p:cNvPr id="2" name="Title 1"/>
+          <p:cNvSpPr>
+            <a:spLocks noGrp="1"/>
+          </p:cNvSpPr>
+          <p:nvPr>
+            <p:ph type="title"/>
+          </p:nvPr>
+        </p:nvSpPr>
+        <p:spPr/>
+        <p:txBody>
+          <a:bodyPr/>
+          <a:lstStyle/>
+          <a:p>
+            <a:r>
+              <a:rPr lang="en-US" dirty="0" smtClean="0"/>
+              <a:t>How to implement it</a:t>
+            </a:r>
+            <a:endParaRPr lang="en-SG" dirty="0"/>
+          </a:p>
+        </p:txBody>
+      </p:sp>
+    </p:spTree>
+    <p:extLst>
+      <p:ext uri="{BB962C8B-B14F-4D97-AF65-F5344CB8AC3E}">
+        <p14:creationId xmlns:p14="http://schemas.microsoft.com/office/powerpoint/2010/main" val="2784469176"/>
+      </p:ext>
+    </p:extLst>
+  </p:cSld>
+  <p:clrMapOvr>
+    <a:masterClrMapping/>
+  </p:clrMapOvr>
+</p:sld>
+</file>
+
 <file path=ppt/slides/slide3.xml><?xml version="1.0" encoding="utf-8"?>
 <p:sld xmlns:a="http://schemas.openxmlformats.org/drawingml/2006/main" xmlns:r="http://schemas.openxmlformats.org/officeDocument/2006/relationships" xmlns:p="http://schemas.openxmlformats.org/presentationml/2006/main">
   <p:cSld>

</xml_diff>

<commit_message>
added implementation using linear combination of content vectors
</commit_message>
<xml_diff>
--- a/exploratory_analysis.pptx
+++ b/exploratory_analysis.pptx
@@ -30,6 +30,7 @@
     <p:sldId id="279" r:id="rId24"/>
     <p:sldId id="280" r:id="rId25"/>
     <p:sldId id="281" r:id="rId26"/>
+    <p:sldId id="282" r:id="rId27"/>
   </p:sldIdLst>
   <p:sldSz cx="9144000" cy="6858000" type="screen4x3"/>
   <p:notesSz cx="6858000" cy="9144000"/>
@@ -328,7 +329,7 @@
           <a:p>
             <a:fld id="{78D2F196-3A47-4CB6-BF2E-B5080B124324}" type="datetimeFigureOut">
               <a:rPr lang="en-US" smtClean="0"/>
-              <a:t>4/20/2017</a:t>
+              <a:t>4/24/2017</a:t>
             </a:fld>
             <a:endParaRPr lang="en-US"/>
           </a:p>
@@ -498,7 +499,7 @@
           <a:p>
             <a:fld id="{78D2F196-3A47-4CB6-BF2E-B5080B124324}" type="datetimeFigureOut">
               <a:rPr lang="en-US" smtClean="0"/>
-              <a:t>4/20/2017</a:t>
+              <a:t>4/24/2017</a:t>
             </a:fld>
             <a:endParaRPr lang="en-US"/>
           </a:p>
@@ -678,7 +679,7 @@
           <a:p>
             <a:fld id="{78D2F196-3A47-4CB6-BF2E-B5080B124324}" type="datetimeFigureOut">
               <a:rPr lang="en-US" smtClean="0"/>
-              <a:t>4/20/2017</a:t>
+              <a:t>4/24/2017</a:t>
             </a:fld>
             <a:endParaRPr lang="en-US"/>
           </a:p>
@@ -848,7 +849,7 @@
           <a:p>
             <a:fld id="{78D2F196-3A47-4CB6-BF2E-B5080B124324}" type="datetimeFigureOut">
               <a:rPr lang="en-US" smtClean="0"/>
-              <a:t>4/20/2017</a:t>
+              <a:t>4/24/2017</a:t>
             </a:fld>
             <a:endParaRPr lang="en-US"/>
           </a:p>
@@ -1094,7 +1095,7 @@
           <a:p>
             <a:fld id="{78D2F196-3A47-4CB6-BF2E-B5080B124324}" type="datetimeFigureOut">
               <a:rPr lang="en-US" smtClean="0"/>
-              <a:t>4/20/2017</a:t>
+              <a:t>4/24/2017</a:t>
             </a:fld>
             <a:endParaRPr lang="en-US"/>
           </a:p>
@@ -1382,7 +1383,7 @@
           <a:p>
             <a:fld id="{78D2F196-3A47-4CB6-BF2E-B5080B124324}" type="datetimeFigureOut">
               <a:rPr lang="en-US" smtClean="0"/>
-              <a:t>4/20/2017</a:t>
+              <a:t>4/24/2017</a:t>
             </a:fld>
             <a:endParaRPr lang="en-US"/>
           </a:p>
@@ -1804,7 +1805,7 @@
           <a:p>
             <a:fld id="{78D2F196-3A47-4CB6-BF2E-B5080B124324}" type="datetimeFigureOut">
               <a:rPr lang="en-US" smtClean="0"/>
-              <a:t>4/20/2017</a:t>
+              <a:t>4/24/2017</a:t>
             </a:fld>
             <a:endParaRPr lang="en-US"/>
           </a:p>
@@ -1922,7 +1923,7 @@
           <a:p>
             <a:fld id="{78D2F196-3A47-4CB6-BF2E-B5080B124324}" type="datetimeFigureOut">
               <a:rPr lang="en-US" smtClean="0"/>
-              <a:t>4/20/2017</a:t>
+              <a:t>4/24/2017</a:t>
             </a:fld>
             <a:endParaRPr lang="en-US"/>
           </a:p>
@@ -2017,7 +2018,7 @@
           <a:p>
             <a:fld id="{78D2F196-3A47-4CB6-BF2E-B5080B124324}" type="datetimeFigureOut">
               <a:rPr lang="en-US" smtClean="0"/>
-              <a:t>4/20/2017</a:t>
+              <a:t>4/24/2017</a:t>
             </a:fld>
             <a:endParaRPr lang="en-US"/>
           </a:p>
@@ -2294,7 +2295,7 @@
           <a:p>
             <a:fld id="{78D2F196-3A47-4CB6-BF2E-B5080B124324}" type="datetimeFigureOut">
               <a:rPr lang="en-US" smtClean="0"/>
-              <a:t>4/20/2017</a:t>
+              <a:t>4/24/2017</a:t>
             </a:fld>
             <a:endParaRPr lang="en-US"/>
           </a:p>
@@ -2547,7 +2548,7 @@
           <a:p>
             <a:fld id="{78D2F196-3A47-4CB6-BF2E-B5080B124324}" type="datetimeFigureOut">
               <a:rPr lang="en-US" smtClean="0"/>
-              <a:t>4/20/2017</a:t>
+              <a:t>4/24/2017</a:t>
             </a:fld>
             <a:endParaRPr lang="en-US"/>
           </a:p>
@@ -2760,7 +2761,7 @@
           <a:p>
             <a:fld id="{78D2F196-3A47-4CB6-BF2E-B5080B124324}" type="datetimeFigureOut">
               <a:rPr lang="en-US" smtClean="0"/>
-              <a:t>4/20/2017</a:t>
+              <a:t>4/24/2017</a:t>
             </a:fld>
             <a:endParaRPr lang="en-US"/>
           </a:p>
@@ -3270,7 +3271,7 @@
         <p:spPr>
           <a:xfrm>
             <a:off x="5919323" y="2514600"/>
-            <a:ext cx="2523448" cy="646331"/>
+            <a:ext cx="1531188" cy="646331"/>
           </a:xfrm>
           <a:prstGeom prst="rect">
             <a:avLst/>
@@ -3284,8 +3285,13 @@
           <a:p>
             <a:r>
               <a:rPr lang="en-SG" dirty="0" smtClean="0"/>
-              <a:t>Mean = 42.49, </a:t>
-            </a:r>
+              <a:t>Mean = </a:t>
+            </a:r>
+            <a:r>
+              <a:rPr lang="en-SG" dirty="0" smtClean="0"/>
+              <a:t>42.49 </a:t>
+            </a:r>
+            <a:endParaRPr lang="en-SG" dirty="0" smtClean="0"/>
           </a:p>
           <a:p>
             <a:r>
@@ -3294,12 +3300,21 @@
             </a:r>
             <a:r>
               <a:rPr lang="en-SG" dirty="0" smtClean="0"/>
-              <a:t>  11.843206377890718</a:t>
-            </a:r>
-            <a:r>
-              <a:rPr lang="en-SG" dirty="0"/>
-              <a:t>)</a:t>
-            </a:r>
+              <a:t>  </a:t>
+            </a:r>
+            <a:r>
+              <a:rPr lang="en-SG" dirty="0" err="1" smtClean="0"/>
+              <a:t>sd</a:t>
+            </a:r>
+            <a:r>
+              <a:rPr lang="en-SG" dirty="0" smtClean="0"/>
+              <a:t> </a:t>
+            </a:r>
+            <a:r>
+              <a:rPr lang="en-SG" smtClean="0"/>
+              <a:t>=    11.84</a:t>
+            </a:r>
+            <a:endParaRPr lang="en-SG" dirty="0"/>
           </a:p>
         </p:txBody>
       </p:sp>
@@ -6146,8 +6161,8 @@
           </a:p>
         </p:txBody>
       </p:sp>
-      <mc:AlternateContent xmlns:mc="http://schemas.openxmlformats.org/markup-compatibility/2006">
-        <mc:Choice xmlns:a14="http://schemas.microsoft.com/office/drawing/2010/main" Requires="a14">
+      <mc:AlternateContent xmlns:mc="http://schemas.openxmlformats.org/markup-compatibility/2006" xmlns:a14="http://schemas.microsoft.com/office/drawing/2010/main">
+        <mc:Choice Requires="a14">
           <p:sp>
             <p:nvSpPr>
               <p:cNvPr id="3" name="Rectangle 2"/>
@@ -6169,6 +6184,7 @@
               </a:bodyPr>
               <a:lstStyle/>
               <a:p>
+                <a:pPr/>
                 <a14:m>
                   <m:oMathPara xmlns:m="http://schemas.openxmlformats.org/officeDocument/2006/math">
                     <m:oMathParaPr>
@@ -6328,6 +6344,7 @@
                 <a:endParaRPr lang="en-US" b="0" dirty="0" smtClean="0"/>
               </a:p>
               <a:p>
+                <a:pPr/>
                 <a14:m>
                   <m:oMathPara xmlns:m="http://schemas.openxmlformats.org/officeDocument/2006/math">
                     <m:oMathParaPr>
@@ -6538,7 +6555,7 @@
                     <m:d>
                       <m:dPr>
                         <m:ctrlPr>
-                          <a:rPr lang="en-US" b="0" i="0" smtClean="0">
+                          <a:rPr lang="en-US" b="0" i="1" smtClean="0">
                             <a:latin typeface="Cambria Math" panose="02040503050406030204" pitchFamily="18" charset="0"/>
                           </a:rPr>
                         </m:ctrlPr>
@@ -6547,7 +6564,7 @@
                         <m:sSub>
                           <m:sSubPr>
                             <m:ctrlPr>
-                              <a:rPr lang="en-US" i="0" smtClean="0">
+                              <a:rPr lang="en-US" i="1" smtClean="0">
                                 <a:latin typeface="Cambria Math" panose="02040503050406030204" pitchFamily="18" charset="0"/>
                               </a:rPr>
                             </m:ctrlPr>
@@ -6796,6 +6813,7 @@
                 <a:endParaRPr lang="en-US" b="1" dirty="0" smtClean="0"/>
               </a:p>
               <a:p>
+                <a:pPr/>
                 <a14:m>
                   <m:oMathPara xmlns:m="http://schemas.openxmlformats.org/officeDocument/2006/math">
                     <m:oMathParaPr>
@@ -6966,6 +6984,7 @@
                 <a:endParaRPr lang="en-US" b="1" dirty="0" smtClean="0"/>
               </a:p>
               <a:p>
+                <a:pPr/>
                 <a14:m>
                   <m:oMathPara xmlns:m="http://schemas.openxmlformats.org/officeDocument/2006/math">
                     <m:oMathParaPr>
@@ -7339,7 +7358,7 @@
             </p:txBody>
           </p:sp>
         </mc:Choice>
-        <mc:Fallback>
+        <mc:Fallback xmlns="">
           <p:sp>
             <p:nvSpPr>
               <p:cNvPr id="3" name="Rectangle 2"/>
@@ -7435,6 +7454,226 @@
     <p:extLst>
       <p:ext uri="{BB962C8B-B14F-4D97-AF65-F5344CB8AC3E}">
         <p14:creationId xmlns:p14="http://schemas.microsoft.com/office/powerpoint/2010/main" val="2784469176"/>
+      </p:ext>
+    </p:extLst>
+  </p:cSld>
+  <p:clrMapOvr>
+    <a:masterClrMapping/>
+  </p:clrMapOvr>
+</p:sld>
+</file>
+
+<file path=ppt/slides/slide26.xml><?xml version="1.0" encoding="utf-8"?>
+<p:sld xmlns:a="http://schemas.openxmlformats.org/drawingml/2006/main" xmlns:r="http://schemas.openxmlformats.org/officeDocument/2006/relationships" xmlns:p="http://schemas.openxmlformats.org/presentationml/2006/main">
+  <p:cSld>
+    <p:spTree>
+      <p:nvGrpSpPr>
+        <p:cNvPr id="1" name=""/>
+        <p:cNvGrpSpPr/>
+        <p:nvPr/>
+      </p:nvGrpSpPr>
+      <p:grpSpPr>
+        <a:xfrm>
+          <a:off x="0" y="0"/>
+          <a:ext cx="0" cy="0"/>
+          <a:chOff x="0" y="0"/>
+          <a:chExt cx="0" cy="0"/>
+        </a:xfrm>
+      </p:grpSpPr>
+      <p:sp>
+        <p:nvSpPr>
+          <p:cNvPr id="2" name="Title 1"/>
+          <p:cNvSpPr>
+            <a:spLocks noGrp="1"/>
+          </p:cNvSpPr>
+          <p:nvPr>
+            <p:ph type="title"/>
+          </p:nvPr>
+        </p:nvSpPr>
+        <p:spPr/>
+        <p:txBody>
+          <a:bodyPr/>
+          <a:lstStyle/>
+          <a:p>
+            <a:r>
+              <a:rPr lang="en-US" dirty="0" smtClean="0"/>
+              <a:t>Joint probability</a:t>
+            </a:r>
+            <a:endParaRPr lang="en-SG" dirty="0"/>
+          </a:p>
+        </p:txBody>
+      </p:sp>
+      <p:sp>
+        <p:nvSpPr>
+          <p:cNvPr id="3" name="Rectangle 2"/>
+          <p:cNvSpPr/>
+          <p:nvPr/>
+        </p:nvSpPr>
+        <p:spPr>
+          <a:xfrm>
+            <a:off x="1905000" y="1600200"/>
+            <a:ext cx="6019800" cy="3970318"/>
+          </a:xfrm>
+          <a:prstGeom prst="rect">
+            <a:avLst/>
+          </a:prstGeom>
+        </p:spPr>
+        <p:txBody>
+          <a:bodyPr wrap="square">
+            <a:spAutoFit/>
+          </a:bodyPr>
+          <a:lstStyle/>
+          <a:p>
+            <a:r>
+              <a:rPr lang="en-SG" dirty="0" err="1"/>
+              <a:t>その他のクーポン</a:t>
+            </a:r>
+            <a:r>
+              <a:rPr lang="en-SG" dirty="0"/>
+              <a:t> m 0.446086888331</a:t>
+            </a:r>
+          </a:p>
+          <a:p>
+            <a:r>
+              <a:rPr lang="en-SG" dirty="0" err="1"/>
+              <a:t>その他のクーポン</a:t>
+            </a:r>
+            <a:r>
+              <a:rPr lang="en-SG" dirty="0"/>
+              <a:t> f 0.553913111669</a:t>
+            </a:r>
+          </a:p>
+          <a:p>
+            <a:r>
+              <a:rPr lang="en-SG" dirty="0" err="1"/>
+              <a:t>ギフトカード</a:t>
+            </a:r>
+            <a:r>
+              <a:rPr lang="en-SG" dirty="0"/>
+              <a:t> m 0.461165970376</a:t>
+            </a:r>
+          </a:p>
+          <a:p>
+            <a:r>
+              <a:rPr lang="en-SG" dirty="0" err="1"/>
+              <a:t>ギフトカード</a:t>
+            </a:r>
+            <a:r>
+              <a:rPr lang="en-SG" dirty="0"/>
+              <a:t> f 0.538834029624</a:t>
+            </a:r>
+          </a:p>
+          <a:p>
+            <a:r>
+              <a:rPr lang="en-SG" dirty="0" err="1"/>
+              <a:t>ホテル・旅館</a:t>
+            </a:r>
+            <a:r>
+              <a:rPr lang="en-SG" dirty="0"/>
+              <a:t> m 0.594041450777</a:t>
+            </a:r>
+          </a:p>
+          <a:p>
+            <a:r>
+              <a:rPr lang="en-SG" dirty="0" err="1"/>
+              <a:t>ホテル・旅館</a:t>
+            </a:r>
+            <a:r>
+              <a:rPr lang="en-SG" dirty="0"/>
+              <a:t> f 0.405958549223</a:t>
+            </a:r>
+          </a:p>
+          <a:p>
+            <a:r>
+              <a:rPr lang="en-SG" dirty="0" err="1"/>
+              <a:t>ビューティ</a:t>
+            </a:r>
+            <a:r>
+              <a:rPr lang="en-SG" dirty="0"/>
+              <a:t>ー m 0.136363636364</a:t>
+            </a:r>
+          </a:p>
+          <a:p>
+            <a:r>
+              <a:rPr lang="en-SG" dirty="0" err="1"/>
+              <a:t>ビューティ</a:t>
+            </a:r>
+            <a:r>
+              <a:rPr lang="en-SG" dirty="0"/>
+              <a:t>ー f 0.863636363636</a:t>
+            </a:r>
+          </a:p>
+          <a:p>
+            <a:r>
+              <a:rPr lang="en-SG" dirty="0" err="1"/>
+              <a:t>エステ</a:t>
+            </a:r>
+            <a:r>
+              <a:rPr lang="en-SG" dirty="0"/>
+              <a:t> m 0.108949416342</a:t>
+            </a:r>
+          </a:p>
+          <a:p>
+            <a:r>
+              <a:rPr lang="en-SG" dirty="0" err="1"/>
+              <a:t>エステ</a:t>
+            </a:r>
+            <a:r>
+              <a:rPr lang="en-SG" dirty="0"/>
+              <a:t> f 0.891050583658</a:t>
+            </a:r>
+          </a:p>
+          <a:p>
+            <a:r>
+              <a:rPr lang="en-SG" dirty="0" err="1"/>
+              <a:t>ヘアサロン</a:t>
+            </a:r>
+            <a:r>
+              <a:rPr lang="en-SG" dirty="0"/>
+              <a:t> m 0.142930856553</a:t>
+            </a:r>
+          </a:p>
+          <a:p>
+            <a:r>
+              <a:rPr lang="en-SG" dirty="0" err="1"/>
+              <a:t>ヘアサロン</a:t>
+            </a:r>
+            <a:r>
+              <a:rPr lang="en-SG" dirty="0"/>
+              <a:t> f 0.857069143447</a:t>
+            </a:r>
+          </a:p>
+          <a:p>
+            <a:r>
+              <a:rPr lang="en-SG" dirty="0" err="1"/>
+              <a:t>健康・医療</a:t>
+            </a:r>
+            <a:r>
+              <a:rPr lang="en-SG" dirty="0"/>
+              <a:t> m 0.313131313131</a:t>
+            </a:r>
+          </a:p>
+          <a:p>
+            <a:r>
+              <a:rPr lang="en-SG" dirty="0" err="1"/>
+              <a:t>健康・医療</a:t>
+            </a:r>
+            <a:r>
+              <a:rPr lang="en-SG" dirty="0"/>
+              <a:t> f </a:t>
+            </a:r>
+            <a:r>
+              <a:rPr lang="en-SG" dirty="0" smtClean="0"/>
+              <a:t>0.686868686869</a:t>
+            </a:r>
+            <a:endParaRPr lang="en-SG" dirty="0"/>
+          </a:p>
+        </p:txBody>
+      </p:sp>
+    </p:spTree>
+    <p:extLst>
+      <p:ext uri="{BB962C8B-B14F-4D97-AF65-F5344CB8AC3E}">
+        <p14:creationId xmlns:p14="http://schemas.microsoft.com/office/powerpoint/2010/main" val="3412750661"/>
       </p:ext>
     </p:extLst>
   </p:cSld>

</xml_diff>